<commit_message>
Extended Dialog to choose catalog several fixed according feedback Doug
</commit_message>
<xml_diff>
--- a/MyFilms.Guzzi/trunk/Documentation/MyFilms Environment.pptx
+++ b/MyFilms.Guzzi/trunk/Documentation/MyFilms Environment.pptx
@@ -1020,7 +1020,15 @@
           </a:r>
           <a:r>
             <a:rPr lang="de-DE" dirty="0" smtClean="0"/>
-            <a:t> Manager (</a:t>
+            <a:t> </a:t>
+          </a:r>
+          <a:r>
+            <a:rPr lang="de-DE" dirty="0" smtClean="0"/>
+            <a:t>Managers </a:t>
+          </a:r>
+          <a:r>
+            <a:rPr lang="de-DE" dirty="0" smtClean="0"/>
+            <a:t>(</a:t>
           </a:r>
           <a:r>
             <a:rPr lang="de-DE" dirty="0" err="1" smtClean="0"/>
@@ -1216,25 +1224,25 @@
       </dgm:t>
     </dgm:pt>
     <dgm:pt modelId="{2D47A800-E22E-450E-B551-2A4553FEAA31}">
-      <dgm:prSet/>
+      <dgm:prSet custT="1"/>
       <dgm:spPr/>
       <dgm:t>
         <a:bodyPr anchor="ctr" anchorCtr="1"/>
         <a:lstStyle/>
         <a:p>
           <a:r>
-            <a:rPr lang="de-DE" dirty="0" smtClean="0"/>
-            <a:t>AMC Manager (</a:t>
-          </a:r>
-          <a:r>
-            <a:rPr lang="de-DE" dirty="0" err="1" smtClean="0"/>
-            <a:t>integrated</a:t>
-          </a:r>
-          <a:r>
-            <a:rPr lang="de-DE" dirty="0" smtClean="0"/>
-            <a:t>)</a:t>
-          </a:r>
-          <a:endParaRPr lang="de-DE" dirty="0"/>
+            <a:rPr lang="de-DE" sz="1600" dirty="0" smtClean="0">
+              <a:solidFill>
+                <a:schemeClr val="bg1"/>
+              </a:solidFill>
+            </a:rPr>
+            <a:t>Integrated Components</a:t>
+          </a:r>
+          <a:endParaRPr lang="de-DE" sz="1200" dirty="0" smtClean="0">
+            <a:solidFill>
+              <a:schemeClr val="bg1"/>
+            </a:solidFill>
+          </a:endParaRPr>
         </a:p>
       </dgm:t>
     </dgm:pt>
@@ -1260,51 +1268,6 @@
         </a:p>
       </dgm:t>
     </dgm:pt>
-    <dgm:pt modelId="{6F540D5A-20FD-4545-8149-B241A1ADD9FB}">
-      <dgm:prSet/>
-      <dgm:spPr/>
-      <dgm:t>
-        <a:bodyPr anchor="ctr" anchorCtr="1"/>
-        <a:lstStyle/>
-        <a:p>
-          <a:r>
-            <a:rPr lang="de-DE" dirty="0" err="1" smtClean="0"/>
-            <a:t>Grabbing</a:t>
-          </a:r>
-          <a:r>
-            <a:rPr lang="de-DE" dirty="0" smtClean="0"/>
-            <a:t> </a:t>
-          </a:r>
-          <a:r>
-            <a:rPr lang="de-DE" dirty="0" err="1" smtClean="0"/>
-            <a:t>Fanart</a:t>
-          </a:r>
-          <a:endParaRPr lang="de-DE" dirty="0"/>
-        </a:p>
-      </dgm:t>
-    </dgm:pt>
-    <dgm:pt modelId="{7BD49258-9C3B-4532-B63A-237096A71993}" type="parTrans" cxnId="{F6659FB1-D044-4506-88A0-DCB7037DF3E4}">
-      <dgm:prSet/>
-      <dgm:spPr/>
-      <dgm:t>
-        <a:bodyPr/>
-        <a:lstStyle/>
-        <a:p>
-          <a:endParaRPr lang="de-DE"/>
-        </a:p>
-      </dgm:t>
-    </dgm:pt>
-    <dgm:pt modelId="{BA6E5CA1-DA7C-4A59-91CD-160DED3C908D}" type="sibTrans" cxnId="{F6659FB1-D044-4506-88A0-DCB7037DF3E4}">
-      <dgm:prSet/>
-      <dgm:spPr/>
-      <dgm:t>
-        <a:bodyPr/>
-        <a:lstStyle/>
-        <a:p>
-          <a:endParaRPr lang="de-DE"/>
-        </a:p>
-      </dgm:t>
-    </dgm:pt>
     <dgm:pt modelId="{7AC40919-58AD-4963-942A-DFF9F06E2873}">
       <dgm:prSet/>
       <dgm:spPr/>
@@ -1313,30 +1276,58 @@
         <a:lstStyle/>
         <a:p>
           <a:r>
-            <a:rPr lang="de-DE" dirty="0" smtClean="0"/>
-            <a:t>Manage </a:t>
-          </a:r>
-          <a:r>
-            <a:rPr lang="de-DE" dirty="0" err="1" smtClean="0"/>
+            <a:rPr lang="de-DE" sz="900" dirty="0" smtClean="0">
+              <a:solidFill>
+                <a:schemeClr val="bg1"/>
+              </a:solidFill>
+            </a:rPr>
+            <a:t> Manage </a:t>
+          </a:r>
+          <a:r>
+            <a:rPr lang="de-DE" sz="900" dirty="0" err="1" smtClean="0">
+              <a:solidFill>
+                <a:schemeClr val="bg1"/>
+              </a:solidFill>
+            </a:rPr>
             <a:t>internal</a:t>
           </a:r>
           <a:r>
-            <a:rPr lang="de-DE" dirty="0" smtClean="0"/>
+            <a:rPr lang="de-DE" sz="900" dirty="0" smtClean="0">
+              <a:solidFill>
+                <a:schemeClr val="bg1"/>
+              </a:solidFill>
+            </a:rPr>
             <a:t> </a:t>
           </a:r>
           <a:r>
-            <a:rPr lang="de-DE" dirty="0" err="1" smtClean="0"/>
+            <a:rPr lang="de-DE" sz="900" dirty="0" err="1" smtClean="0">
+              <a:solidFill>
+                <a:schemeClr val="bg1"/>
+              </a:solidFill>
+            </a:rPr>
             <a:t>Movie</a:t>
           </a:r>
           <a:r>
-            <a:rPr lang="de-DE" dirty="0" smtClean="0"/>
+            <a:rPr lang="de-DE" sz="900" dirty="0" smtClean="0">
+              <a:solidFill>
+                <a:schemeClr val="bg1"/>
+              </a:solidFill>
+            </a:rPr>
             <a:t> </a:t>
           </a:r>
           <a:r>
-            <a:rPr lang="de-DE" dirty="0" err="1" smtClean="0"/>
+            <a:rPr lang="de-DE" sz="900" dirty="0" err="1" smtClean="0">
+              <a:solidFill>
+                <a:schemeClr val="bg1"/>
+              </a:solidFill>
+            </a:rPr>
             <a:t>Catalog</a:t>
           </a:r>
-          <a:endParaRPr lang="de-DE" dirty="0"/>
+          <a:endParaRPr lang="de-DE" sz="900" dirty="0">
+            <a:solidFill>
+              <a:schemeClr val="bg1"/>
+            </a:solidFill>
+          </a:endParaRPr>
         </a:p>
       </dgm:t>
     </dgm:pt>
@@ -1362,47 +1353,6 @@
         </a:p>
       </dgm:t>
     </dgm:pt>
-    <dgm:pt modelId="{5EC9A276-C260-4ADF-B40E-BD9E4EE50F68}">
-      <dgm:prSet/>
-      <dgm:spPr/>
-      <dgm:t>
-        <a:bodyPr anchor="ctr" anchorCtr="1"/>
-        <a:lstStyle/>
-        <a:p>
-          <a:r>
-            <a:rPr lang="de-DE" dirty="0" err="1" smtClean="0"/>
-            <a:t>Updating</a:t>
-          </a:r>
-          <a:r>
-            <a:rPr lang="de-DE" dirty="0" smtClean="0"/>
-            <a:t> Data</a:t>
-          </a:r>
-          <a:endParaRPr lang="de-DE" dirty="0"/>
-        </a:p>
-      </dgm:t>
-    </dgm:pt>
-    <dgm:pt modelId="{D0ED3A3B-BD74-4C51-AB5E-5E5381E315E7}" type="parTrans" cxnId="{0692FC60-B87C-4F47-9A45-2A8213F00A21}">
-      <dgm:prSet/>
-      <dgm:spPr/>
-      <dgm:t>
-        <a:bodyPr/>
-        <a:lstStyle/>
-        <a:p>
-          <a:endParaRPr lang="de-DE"/>
-        </a:p>
-      </dgm:t>
-    </dgm:pt>
-    <dgm:pt modelId="{41644D9A-C100-45C7-BDBA-5BF2982CE40B}" type="sibTrans" cxnId="{0692FC60-B87C-4F47-9A45-2A8213F00A21}">
-      <dgm:prSet/>
-      <dgm:spPr/>
-      <dgm:t>
-        <a:bodyPr/>
-        <a:lstStyle/>
-        <a:p>
-          <a:endParaRPr lang="de-DE"/>
-        </a:p>
-      </dgm:t>
-    </dgm:pt>
     <dgm:pt modelId="{0F9B4200-4F89-4E0E-A12B-631AE80CB889}">
       <dgm:prSet/>
       <dgm:spPr/>
@@ -1411,18 +1361,42 @@
         <a:lstStyle/>
         <a:p>
           <a:r>
-            <a:rPr lang="de-DE" dirty="0" smtClean="0"/>
-            <a:t>Scanning / </a:t>
-          </a:r>
-          <a:r>
-            <a:rPr lang="de-DE" dirty="0" err="1" smtClean="0"/>
+            <a:rPr lang="de-DE" sz="900" dirty="0" smtClean="0">
+              <a:solidFill>
+                <a:schemeClr val="bg1"/>
+              </a:solidFill>
+            </a:rPr>
+            <a:t> Scanning </a:t>
+          </a:r>
+          <a:r>
+            <a:rPr lang="de-DE" sz="900" dirty="0" smtClean="0">
+              <a:solidFill>
+                <a:schemeClr val="bg1"/>
+              </a:solidFill>
+            </a:rPr>
+            <a:t>/ </a:t>
+          </a:r>
+          <a:r>
+            <a:rPr lang="de-DE" sz="900" dirty="0" err="1" smtClean="0">
+              <a:solidFill>
+                <a:schemeClr val="bg1"/>
+              </a:solidFill>
+            </a:rPr>
             <a:t>Updating</a:t>
           </a:r>
           <a:r>
-            <a:rPr lang="de-DE" dirty="0" smtClean="0"/>
+            <a:rPr lang="de-DE" sz="900" dirty="0" smtClean="0">
+              <a:solidFill>
+                <a:schemeClr val="bg1"/>
+              </a:solidFill>
+            </a:rPr>
             <a:t> Films</a:t>
           </a:r>
-          <a:endParaRPr lang="de-DE" dirty="0"/>
+          <a:endParaRPr lang="de-DE" sz="900" dirty="0">
+            <a:solidFill>
+              <a:schemeClr val="bg1"/>
+            </a:solidFill>
+          </a:endParaRPr>
         </a:p>
       </dgm:t>
     </dgm:pt>
@@ -1456,10 +1430,18 @@
         <a:lstStyle/>
         <a:p>
           <a:r>
-            <a:rPr lang="de-DE" dirty="0" smtClean="0"/>
-            <a:t>Edit Database</a:t>
-          </a:r>
-          <a:endParaRPr lang="de-DE" dirty="0"/>
+            <a:rPr lang="de-DE" sz="900" dirty="0" smtClean="0">
+              <a:solidFill>
+                <a:schemeClr val="bg1"/>
+              </a:solidFill>
+            </a:rPr>
+            <a:t> Edit Database</a:t>
+          </a:r>
+          <a:endParaRPr lang="de-DE" sz="900" dirty="0">
+            <a:solidFill>
+              <a:schemeClr val="bg1"/>
+            </a:solidFill>
+          </a:endParaRPr>
         </a:p>
       </dgm:t>
     </dgm:pt>
@@ -1584,14 +1566,74 @@
         <a:lstStyle/>
         <a:p>
           <a:r>
-            <a:rPr lang="de-DE" dirty="0" err="1" smtClean="0"/>
+            <a:rPr lang="de-DE" sz="900" dirty="0" smtClean="0">
+              <a:solidFill>
+                <a:schemeClr val="bg1"/>
+              </a:solidFill>
+            </a:rPr>
+            <a:t> </a:t>
+          </a:r>
+          <a:r>
+            <a:rPr lang="de-DE" sz="900" dirty="0" err="1" smtClean="0">
+              <a:solidFill>
+                <a:schemeClr val="bg1"/>
+              </a:solidFill>
+            </a:rPr>
             <a:t>Grabbing</a:t>
           </a:r>
           <a:r>
-            <a:rPr lang="de-DE" dirty="0" smtClean="0"/>
-            <a:t> Internet Data</a:t>
-          </a:r>
-          <a:endParaRPr lang="de-DE" dirty="0"/>
+            <a:rPr lang="de-DE" sz="900" dirty="0" smtClean="0">
+              <a:solidFill>
+                <a:schemeClr val="bg1"/>
+              </a:solidFill>
+            </a:rPr>
+            <a:t> </a:t>
+          </a:r>
+          <a:r>
+            <a:rPr lang="de-DE" sz="900" dirty="0" smtClean="0">
+              <a:solidFill>
+                <a:schemeClr val="bg1"/>
+              </a:solidFill>
+            </a:rPr>
+            <a:t>Internet </a:t>
+          </a:r>
+          <a:r>
+            <a:rPr lang="de-DE" sz="900" dirty="0" smtClean="0">
+              <a:solidFill>
+                <a:schemeClr val="bg1"/>
+              </a:solidFill>
+            </a:rPr>
+            <a:t>Data </a:t>
+          </a:r>
+          <a:r>
+            <a:rPr lang="de-DE" sz="900" dirty="0" err="1" smtClean="0">
+              <a:solidFill>
+                <a:schemeClr val="bg1"/>
+              </a:solidFill>
+            </a:rPr>
+            <a:t>and</a:t>
+          </a:r>
+          <a:r>
+            <a:rPr lang="de-DE" sz="900" dirty="0" smtClean="0">
+              <a:solidFill>
+                <a:schemeClr val="bg1"/>
+              </a:solidFill>
+            </a:rPr>
+            <a:t> </a:t>
+          </a:r>
+          <a:r>
+            <a:rPr lang="de-DE" sz="900" dirty="0" err="1" smtClean="0">
+              <a:solidFill>
+                <a:schemeClr val="bg1"/>
+              </a:solidFill>
+            </a:rPr>
+            <a:t>Fanart</a:t>
+          </a:r>
+          <a:endParaRPr lang="de-DE" sz="900" dirty="0">
+            <a:solidFill>
+              <a:schemeClr val="bg1"/>
+            </a:solidFill>
+          </a:endParaRPr>
         </a:p>
       </dgm:t>
     </dgm:pt>
@@ -1626,7 +1668,11 @@
         <a:p>
           <a:r>
             <a:rPr lang="de-DE" dirty="0" smtClean="0"/>
-            <a:t> XBMC</a:t>
+            <a:t> </a:t>
+          </a:r>
+          <a:r>
+            <a:rPr lang="de-DE" dirty="0" smtClean="0"/>
+            <a:t>Personal Video Database</a:t>
           </a:r>
           <a:endParaRPr lang="de-DE" dirty="0"/>
         </a:p>
@@ -2038,6 +2084,599 @@
       </dgm:t>
     </dgm:pt>
     <dgm:pt modelId="{68E00D28-D60C-4618-BD26-9E441AE8B033}" type="sibTrans" cxnId="{104A55A5-18ED-453D-A8EF-B3D7015BCB65}">
+      <dgm:prSet/>
+      <dgm:spPr/>
+      <dgm:t>
+        <a:bodyPr/>
+        <a:lstStyle/>
+        <a:p>
+          <a:endParaRPr lang="de-DE"/>
+        </a:p>
+      </dgm:t>
+    </dgm:pt>
+    <dgm:pt modelId="{7AAB1E8D-EDC5-4808-BB17-E168FF1D4DE5}">
+      <dgm:prSet custRadScaleRad="33365" custRadScaleInc="-358123"/>
+      <dgm:spPr/>
+    </dgm:pt>
+    <dgm:pt modelId="{7092AB1A-F1F7-4A1E-B11D-B4D1125D2D5B}" type="parTrans" cxnId="{B51D16F0-8158-4B36-A0CA-9D38D94FC1F1}">
+      <dgm:prSet/>
+      <dgm:spPr/>
+      <dgm:t>
+        <a:bodyPr/>
+        <a:lstStyle/>
+        <a:p>
+          <a:endParaRPr lang="de-DE"/>
+        </a:p>
+      </dgm:t>
+    </dgm:pt>
+    <dgm:pt modelId="{807C31F2-2D0B-45B7-8960-2C2EFD23E70C}" type="sibTrans" cxnId="{B51D16F0-8158-4B36-A0CA-9D38D94FC1F1}">
+      <dgm:prSet/>
+      <dgm:spPr/>
+      <dgm:t>
+        <a:bodyPr/>
+        <a:lstStyle/>
+        <a:p>
+          <a:endParaRPr lang="de-DE"/>
+        </a:p>
+      </dgm:t>
+    </dgm:pt>
+    <dgm:pt modelId="{406ACA2A-AAFB-407F-92BC-4D75BC0F7C11}">
+      <dgm:prSet custRadScaleRad="33365" custRadScaleInc="-358123"/>
+      <dgm:spPr/>
+    </dgm:pt>
+    <dgm:pt modelId="{A055DB7E-0003-4225-9093-E0B88240BBE0}" type="parTrans" cxnId="{1647C037-3773-44BC-B5DF-CC092DB6DC7E}">
+      <dgm:prSet/>
+      <dgm:spPr/>
+      <dgm:t>
+        <a:bodyPr/>
+        <a:lstStyle/>
+        <a:p>
+          <a:endParaRPr lang="de-DE"/>
+        </a:p>
+      </dgm:t>
+    </dgm:pt>
+    <dgm:pt modelId="{B1F85018-77CF-4A14-B29C-E138F25DDA43}" type="sibTrans" cxnId="{1647C037-3773-44BC-B5DF-CC092DB6DC7E}">
+      <dgm:prSet/>
+      <dgm:spPr/>
+      <dgm:t>
+        <a:bodyPr/>
+        <a:lstStyle/>
+        <a:p>
+          <a:endParaRPr lang="de-DE"/>
+        </a:p>
+      </dgm:t>
+    </dgm:pt>
+    <dgm:pt modelId="{A9692A02-8CAD-4842-B666-4692D91A1ED5}">
+      <dgm:prSet custRadScaleRad="33365" custRadScaleInc="-358123"/>
+      <dgm:spPr/>
+    </dgm:pt>
+    <dgm:pt modelId="{8FF7368B-3A47-4160-B1FB-4184454C1428}" type="parTrans" cxnId="{26352D4B-B6FF-47E6-AE7D-6664DC7272A8}">
+      <dgm:prSet/>
+      <dgm:spPr/>
+      <dgm:t>
+        <a:bodyPr/>
+        <a:lstStyle/>
+        <a:p>
+          <a:endParaRPr lang="de-DE"/>
+        </a:p>
+      </dgm:t>
+    </dgm:pt>
+    <dgm:pt modelId="{5E0FF279-1BA3-444A-9C6F-99320F8E27A5}" type="sibTrans" cxnId="{26352D4B-B6FF-47E6-AE7D-6664DC7272A8}">
+      <dgm:prSet/>
+      <dgm:spPr/>
+      <dgm:t>
+        <a:bodyPr/>
+        <a:lstStyle/>
+        <a:p>
+          <a:endParaRPr lang="de-DE"/>
+        </a:p>
+      </dgm:t>
+    </dgm:pt>
+    <dgm:pt modelId="{DAFA9E92-0638-4E3D-A17C-08A411EC99DF}">
+      <dgm:prSet custRadScaleRad="33365" custRadScaleInc="-358123"/>
+      <dgm:spPr/>
+    </dgm:pt>
+    <dgm:pt modelId="{97D7AE8E-9F8F-462E-9938-F3826C22201F}" type="parTrans" cxnId="{1B8B98A5-AC25-485A-AFE7-E97CEA2FE387}">
+      <dgm:prSet/>
+      <dgm:spPr/>
+      <dgm:t>
+        <a:bodyPr/>
+        <a:lstStyle/>
+        <a:p>
+          <a:endParaRPr lang="de-DE"/>
+        </a:p>
+      </dgm:t>
+    </dgm:pt>
+    <dgm:pt modelId="{54751568-42DD-4FEE-81E7-C21178DF748E}" type="sibTrans" cxnId="{1B8B98A5-AC25-485A-AFE7-E97CEA2FE387}">
+      <dgm:prSet/>
+      <dgm:spPr/>
+      <dgm:t>
+        <a:bodyPr/>
+        <a:lstStyle/>
+        <a:p>
+          <a:endParaRPr lang="de-DE"/>
+        </a:p>
+      </dgm:t>
+    </dgm:pt>
+    <dgm:pt modelId="{80808EEF-9A01-4BEB-8649-EF4C72417A00}">
+      <dgm:prSet custRadScaleRad="33365" custRadScaleInc="-358123"/>
+      <dgm:spPr/>
+    </dgm:pt>
+    <dgm:pt modelId="{AFD8E1E5-1C14-4C2F-9A95-DAAC5B42D4EA}" type="parTrans" cxnId="{BD6B26BE-D606-4045-8236-8B92A52B37AC}">
+      <dgm:prSet/>
+      <dgm:spPr/>
+      <dgm:t>
+        <a:bodyPr/>
+        <a:lstStyle/>
+        <a:p>
+          <a:endParaRPr lang="de-DE"/>
+        </a:p>
+      </dgm:t>
+    </dgm:pt>
+    <dgm:pt modelId="{9133B303-3075-458F-9FAB-A66E4907D781}" type="sibTrans" cxnId="{BD6B26BE-D606-4045-8236-8B92A52B37AC}">
+      <dgm:prSet/>
+      <dgm:spPr/>
+      <dgm:t>
+        <a:bodyPr/>
+        <a:lstStyle/>
+        <a:p>
+          <a:endParaRPr lang="de-DE"/>
+        </a:p>
+      </dgm:t>
+    </dgm:pt>
+    <dgm:pt modelId="{1719E1B8-65AB-4F26-8507-53CC9529C756}">
+      <dgm:prSet custRadScaleRad="33365" custRadScaleInc="-358123"/>
+      <dgm:spPr/>
+    </dgm:pt>
+    <dgm:pt modelId="{7EACC275-8818-46BF-AF85-2D3521B8CAC5}" type="parTrans" cxnId="{35D168BA-B36B-457E-BEB6-11C4E5006E74}">
+      <dgm:prSet/>
+      <dgm:spPr/>
+      <dgm:t>
+        <a:bodyPr/>
+        <a:lstStyle/>
+        <a:p>
+          <a:endParaRPr lang="de-DE"/>
+        </a:p>
+      </dgm:t>
+    </dgm:pt>
+    <dgm:pt modelId="{DD36B6F8-29D5-4925-94CE-AB244DEB8C70}" type="sibTrans" cxnId="{35D168BA-B36B-457E-BEB6-11C4E5006E74}">
+      <dgm:prSet/>
+      <dgm:spPr/>
+      <dgm:t>
+        <a:bodyPr/>
+        <a:lstStyle/>
+        <a:p>
+          <a:endParaRPr lang="de-DE"/>
+        </a:p>
+      </dgm:t>
+    </dgm:pt>
+    <dgm:pt modelId="{D3D7D615-2721-411C-8C7D-BDA6572C165C}">
+      <dgm:prSet custRadScaleRad="33365" custRadScaleInc="-358123"/>
+      <dgm:spPr/>
+    </dgm:pt>
+    <dgm:pt modelId="{6CB60B9A-769A-400A-9D55-12BB9271F8CD}" type="parTrans" cxnId="{B3A4ABA2-5CC8-4781-B1A3-EF0570E1CE62}">
+      <dgm:prSet/>
+      <dgm:spPr/>
+      <dgm:t>
+        <a:bodyPr/>
+        <a:lstStyle/>
+        <a:p>
+          <a:endParaRPr lang="de-DE"/>
+        </a:p>
+      </dgm:t>
+    </dgm:pt>
+    <dgm:pt modelId="{90912AC2-6A4E-4C6B-A61F-9F9716017E42}" type="sibTrans" cxnId="{B3A4ABA2-5CC8-4781-B1A3-EF0570E1CE62}">
+      <dgm:prSet/>
+      <dgm:spPr/>
+      <dgm:t>
+        <a:bodyPr/>
+        <a:lstStyle/>
+        <a:p>
+          <a:endParaRPr lang="de-DE"/>
+        </a:p>
+      </dgm:t>
+    </dgm:pt>
+    <dgm:pt modelId="{2E4B2F45-7376-412C-A61B-C71805181D05}">
+      <dgm:prSet/>
+      <dgm:spPr/>
+      <dgm:t>
+        <a:bodyPr/>
+        <a:lstStyle/>
+        <a:p>
+          <a:r>
+            <a:rPr lang="de-DE" sz="900" dirty="0" smtClean="0">
+              <a:solidFill>
+                <a:schemeClr val="bg1"/>
+              </a:solidFill>
+            </a:rPr>
+            <a:t> Create &amp; </a:t>
+          </a:r>
+          <a:r>
+            <a:rPr lang="de-DE" sz="900" dirty="0" err="1" smtClean="0">
+              <a:solidFill>
+                <a:schemeClr val="bg1"/>
+              </a:solidFill>
+            </a:rPr>
+            <a:t>edit</a:t>
+          </a:r>
+          <a:r>
+            <a:rPr lang="de-DE" sz="900" dirty="0" smtClean="0">
+              <a:solidFill>
+                <a:schemeClr val="bg1"/>
+              </a:solidFill>
+            </a:rPr>
+            <a:t> </a:t>
+          </a:r>
+          <a:r>
+            <a:rPr lang="de-DE" sz="900" dirty="0" err="1" smtClean="0">
+              <a:solidFill>
+                <a:schemeClr val="bg1"/>
+              </a:solidFill>
+            </a:rPr>
+            <a:t>internet</a:t>
+          </a:r>
+          <a:r>
+            <a:rPr lang="de-DE" sz="900" dirty="0" smtClean="0">
+              <a:solidFill>
+                <a:schemeClr val="bg1"/>
+              </a:solidFill>
+            </a:rPr>
+            <a:t> </a:t>
+          </a:r>
+          <a:r>
+            <a:rPr lang="de-DE" sz="900" dirty="0" err="1" smtClean="0">
+              <a:solidFill>
+                <a:schemeClr val="bg1"/>
+              </a:solidFill>
+            </a:rPr>
+            <a:t>grabber</a:t>
+          </a:r>
+          <a:r>
+            <a:rPr lang="de-DE" sz="900" dirty="0" smtClean="0">
+              <a:solidFill>
+                <a:schemeClr val="bg1"/>
+              </a:solidFill>
+            </a:rPr>
+            <a:t> </a:t>
+          </a:r>
+          <a:r>
+            <a:rPr lang="de-DE" sz="900" dirty="0" err="1" smtClean="0">
+              <a:solidFill>
+                <a:schemeClr val="bg1"/>
+              </a:solidFill>
+            </a:rPr>
+            <a:t>scripts</a:t>
+          </a:r>
+          <a:endParaRPr lang="de-DE" sz="900" dirty="0">
+            <a:solidFill>
+              <a:schemeClr val="bg1"/>
+            </a:solidFill>
+          </a:endParaRPr>
+        </a:p>
+      </dgm:t>
+    </dgm:pt>
+    <dgm:pt modelId="{D03BE5F7-742E-408F-BD65-4914374EA44B}" type="parTrans" cxnId="{AF236F9A-521E-4695-8CA7-E07B694CFE4C}">
+      <dgm:prSet/>
+      <dgm:spPr/>
+      <dgm:t>
+        <a:bodyPr/>
+        <a:lstStyle/>
+        <a:p>
+          <a:endParaRPr lang="de-DE"/>
+        </a:p>
+      </dgm:t>
+    </dgm:pt>
+    <dgm:pt modelId="{5DF6C0C8-1674-4C9D-918B-368DD4BD92D7}" type="sibTrans" cxnId="{AF236F9A-521E-4695-8CA7-E07B694CFE4C}">
+      <dgm:prSet/>
+      <dgm:spPr/>
+      <dgm:t>
+        <a:bodyPr/>
+        <a:lstStyle/>
+        <a:p>
+          <a:endParaRPr lang="de-DE"/>
+        </a:p>
+      </dgm:t>
+    </dgm:pt>
+    <dgm:pt modelId="{951A398F-1340-4BD7-A613-3706D21E2D7D}">
+      <dgm:prSet/>
+      <dgm:spPr/>
+      <dgm:t>
+        <a:bodyPr/>
+        <a:lstStyle/>
+        <a:p>
+          <a:r>
+            <a:rPr lang="de-DE" dirty="0" smtClean="0"/>
+            <a:t> XBMC</a:t>
+          </a:r>
+          <a:endParaRPr lang="de-DE" dirty="0"/>
+        </a:p>
+      </dgm:t>
+    </dgm:pt>
+    <dgm:pt modelId="{0641C504-F6C8-4EFD-8156-ECF389810430}" type="parTrans" cxnId="{C4282562-3102-400E-9FE9-BF3BF397C1F7}">
+      <dgm:prSet/>
+      <dgm:spPr/>
+      <dgm:t>
+        <a:bodyPr/>
+        <a:lstStyle/>
+        <a:p>
+          <a:endParaRPr lang="de-DE"/>
+        </a:p>
+      </dgm:t>
+    </dgm:pt>
+    <dgm:pt modelId="{F4B37CEE-62F3-4071-A72C-5197DA647390}" type="sibTrans" cxnId="{C4282562-3102-400E-9FE9-BF3BF397C1F7}">
+      <dgm:prSet/>
+      <dgm:spPr/>
+      <dgm:t>
+        <a:bodyPr/>
+        <a:lstStyle/>
+        <a:p>
+          <a:endParaRPr lang="de-DE"/>
+        </a:p>
+      </dgm:t>
+    </dgm:pt>
+    <dgm:pt modelId="{5EC9A276-C260-4ADF-B40E-BD9E4EE50F68}">
+      <dgm:prSet custT="1"/>
+      <dgm:spPr/>
+      <dgm:t>
+        <a:bodyPr anchor="ctr" anchorCtr="1"/>
+        <a:lstStyle/>
+        <a:p>
+          <a:r>
+            <a:rPr lang="de-DE" sz="1200" b="1" dirty="0" smtClean="0">
+              <a:solidFill>
+                <a:schemeClr val="bg1"/>
+              </a:solidFill>
+            </a:rPr>
+            <a:t>AMC </a:t>
+          </a:r>
+          <a:r>
+            <a:rPr lang="de-DE" sz="1200" b="1" dirty="0" err="1" smtClean="0">
+              <a:solidFill>
+                <a:schemeClr val="bg1"/>
+              </a:solidFill>
+            </a:rPr>
+            <a:t>Updater</a:t>
+          </a:r>
+          <a:endParaRPr lang="de-DE" sz="1200" b="1" dirty="0">
+            <a:solidFill>
+              <a:schemeClr val="bg1"/>
+            </a:solidFill>
+          </a:endParaRPr>
+        </a:p>
+      </dgm:t>
+    </dgm:pt>
+    <dgm:pt modelId="{41644D9A-C100-45C7-BDBA-5BF2982CE40B}" type="sibTrans" cxnId="{0692FC60-B87C-4F47-9A45-2A8213F00A21}">
+      <dgm:prSet/>
+      <dgm:spPr/>
+      <dgm:t>
+        <a:bodyPr/>
+        <a:lstStyle/>
+        <a:p>
+          <a:endParaRPr lang="de-DE"/>
+        </a:p>
+      </dgm:t>
+    </dgm:pt>
+    <dgm:pt modelId="{D0ED3A3B-BD74-4C51-AB5E-5E5381E315E7}" type="parTrans" cxnId="{0692FC60-B87C-4F47-9A45-2A8213F00A21}">
+      <dgm:prSet/>
+      <dgm:spPr/>
+      <dgm:t>
+        <a:bodyPr/>
+        <a:lstStyle/>
+        <a:p>
+          <a:endParaRPr lang="de-DE"/>
+        </a:p>
+      </dgm:t>
+    </dgm:pt>
+    <dgm:pt modelId="{521DB9C5-6C86-4462-BE8B-20E4587C21FC}">
+      <dgm:prSet custT="1"/>
+      <dgm:spPr/>
+      <dgm:t>
+        <a:bodyPr anchor="ctr" anchorCtr="1"/>
+        <a:lstStyle/>
+        <a:p>
+          <a:r>
+            <a:rPr lang="de-DE" sz="1200" b="1" dirty="0" err="1" smtClean="0">
+              <a:solidFill>
+                <a:schemeClr val="bg1"/>
+              </a:solidFill>
+            </a:rPr>
+            <a:t>Grabber</a:t>
+          </a:r>
+          <a:r>
+            <a:rPr lang="de-DE" sz="1200" b="1" dirty="0" smtClean="0">
+              <a:solidFill>
+                <a:schemeClr val="bg1"/>
+              </a:solidFill>
+            </a:rPr>
+            <a:t> Interface</a:t>
+          </a:r>
+          <a:endParaRPr lang="de-DE" sz="1200" b="1" dirty="0">
+            <a:solidFill>
+              <a:schemeClr val="bg1"/>
+            </a:solidFill>
+          </a:endParaRPr>
+        </a:p>
+      </dgm:t>
+    </dgm:pt>
+    <dgm:pt modelId="{BF7E3172-E7BE-4F12-B7D7-9E43A7B8651C}" type="sibTrans" cxnId="{D503C129-2CFD-46CF-8D82-609B8F92AAAE}">
+      <dgm:prSet/>
+      <dgm:spPr/>
+      <dgm:t>
+        <a:bodyPr/>
+        <a:lstStyle/>
+        <a:p>
+          <a:endParaRPr lang="de-DE"/>
+        </a:p>
+      </dgm:t>
+    </dgm:pt>
+    <dgm:pt modelId="{B06AE8D0-2D1B-4EF5-B884-E58E1C173DA7}" type="parTrans" cxnId="{D503C129-2CFD-46CF-8D82-609B8F92AAAE}">
+      <dgm:prSet/>
+      <dgm:spPr/>
+      <dgm:t>
+        <a:bodyPr/>
+        <a:lstStyle/>
+        <a:p>
+          <a:endParaRPr lang="de-DE"/>
+        </a:p>
+      </dgm:t>
+    </dgm:pt>
+    <dgm:pt modelId="{8B1DAD2D-0A6A-466D-AD46-C55684DCD61A}">
+      <dgm:prSet/>
+      <dgm:spPr/>
+      <dgm:t>
+        <a:bodyPr anchor="ctr" anchorCtr="1"/>
+        <a:lstStyle/>
+        <a:p>
+          <a:r>
+            <a:rPr lang="de-DE" sz="900" dirty="0" err="1" smtClean="0">
+              <a:solidFill>
+                <a:schemeClr val="bg1"/>
+              </a:solidFill>
+            </a:rPr>
+            <a:t>Updating</a:t>
+          </a:r>
+          <a:r>
+            <a:rPr lang="de-DE" sz="900" dirty="0" smtClean="0">
+              <a:solidFill>
+                <a:schemeClr val="bg1"/>
+              </a:solidFill>
+            </a:rPr>
+            <a:t> </a:t>
+          </a:r>
+          <a:r>
+            <a:rPr lang="de-DE" sz="900" dirty="0" err="1" smtClean="0">
+              <a:solidFill>
+                <a:schemeClr val="bg1"/>
+              </a:solidFill>
+            </a:rPr>
+            <a:t>data</a:t>
+          </a:r>
+          <a:endParaRPr lang="de-DE" sz="900" dirty="0">
+            <a:solidFill>
+              <a:schemeClr val="bg1"/>
+            </a:solidFill>
+          </a:endParaRPr>
+        </a:p>
+      </dgm:t>
+    </dgm:pt>
+    <dgm:pt modelId="{A4FFB17F-04E6-4068-94B6-0AE36CD479A0}" type="parTrans" cxnId="{900178D3-6C55-4114-A82A-1CA4C3AE7BCC}">
+      <dgm:prSet/>
+      <dgm:spPr/>
+      <dgm:t>
+        <a:bodyPr/>
+        <a:lstStyle/>
+        <a:p>
+          <a:endParaRPr lang="de-DE"/>
+        </a:p>
+      </dgm:t>
+    </dgm:pt>
+    <dgm:pt modelId="{3F823D6E-C049-4873-9B6F-3E39E5E1308F}" type="sibTrans" cxnId="{900178D3-6C55-4114-A82A-1CA4C3AE7BCC}">
+      <dgm:prSet/>
+      <dgm:spPr/>
+      <dgm:t>
+        <a:bodyPr/>
+        <a:lstStyle/>
+        <a:p>
+          <a:endParaRPr lang="de-DE"/>
+        </a:p>
+      </dgm:t>
+    </dgm:pt>
+    <dgm:pt modelId="{73CEFFF8-35E5-4728-8E0E-6E29B919EC7B}">
+      <dgm:prSet custT="1"/>
+      <dgm:spPr/>
+      <dgm:t>
+        <a:bodyPr anchor="ctr" anchorCtr="1"/>
+        <a:lstStyle/>
+        <a:p>
+          <a:r>
+            <a:rPr lang="de-DE" sz="1200" b="1" dirty="0" err="1" smtClean="0">
+              <a:solidFill>
+                <a:schemeClr val="bg1"/>
+              </a:solidFill>
+            </a:rPr>
+            <a:t>MyFilms</a:t>
+          </a:r>
+          <a:r>
+            <a:rPr lang="de-DE" sz="1200" b="1" dirty="0" smtClean="0">
+              <a:solidFill>
+                <a:schemeClr val="bg1"/>
+              </a:solidFill>
+            </a:rPr>
+            <a:t> Setup</a:t>
+          </a:r>
+          <a:endParaRPr lang="de-DE" sz="1200" b="1" dirty="0">
+            <a:solidFill>
+              <a:schemeClr val="bg1"/>
+            </a:solidFill>
+          </a:endParaRPr>
+        </a:p>
+      </dgm:t>
+    </dgm:pt>
+    <dgm:pt modelId="{C77A319B-8487-423E-A529-29718FAACCA9}" type="parTrans" cxnId="{DF3C357A-B86F-466A-A939-A22F8625B45C}">
+      <dgm:prSet/>
+      <dgm:spPr/>
+      <dgm:t>
+        <a:bodyPr/>
+        <a:lstStyle/>
+        <a:p>
+          <a:endParaRPr lang="de-DE"/>
+        </a:p>
+      </dgm:t>
+    </dgm:pt>
+    <dgm:pt modelId="{3FDE03FB-D050-40DA-A41E-9C7EC7ECE437}" type="sibTrans" cxnId="{DF3C357A-B86F-466A-A939-A22F8625B45C}">
+      <dgm:prSet/>
+      <dgm:spPr/>
+      <dgm:t>
+        <a:bodyPr/>
+        <a:lstStyle/>
+        <a:p>
+          <a:endParaRPr lang="de-DE"/>
+        </a:p>
+      </dgm:t>
+    </dgm:pt>
+    <dgm:pt modelId="{91B78057-8A07-42CE-B4A0-0F503D88C162}">
+      <dgm:prSet custT="1"/>
+      <dgm:spPr/>
+      <dgm:t>
+        <a:bodyPr anchor="ctr" anchorCtr="1"/>
+        <a:lstStyle/>
+        <a:p>
+          <a:r>
+            <a:rPr lang="de-DE" sz="900" b="1" dirty="0" smtClean="0">
+              <a:solidFill>
+                <a:schemeClr val="bg1"/>
+              </a:solidFill>
+            </a:rPr>
+            <a:t> </a:t>
+          </a:r>
+          <a:r>
+            <a:rPr lang="de-DE" sz="900" b="0" dirty="0" err="1" smtClean="0">
+              <a:solidFill>
+                <a:schemeClr val="bg1"/>
+              </a:solidFill>
+            </a:rPr>
+            <a:t>Configuration</a:t>
+          </a:r>
+          <a:endParaRPr lang="de-DE" sz="900" b="0" dirty="0">
+            <a:solidFill>
+              <a:schemeClr val="bg1"/>
+            </a:solidFill>
+          </a:endParaRPr>
+        </a:p>
+      </dgm:t>
+    </dgm:pt>
+    <dgm:pt modelId="{AA7D76F8-42E7-4D95-BAC7-076AAC6E240E}" type="parTrans" cxnId="{034D111F-5C50-44E3-BBB3-68017A44BEA3}">
+      <dgm:prSet/>
+      <dgm:spPr/>
+      <dgm:t>
+        <a:bodyPr/>
+        <a:lstStyle/>
+        <a:p>
+          <a:endParaRPr lang="de-DE"/>
+        </a:p>
+      </dgm:t>
+    </dgm:pt>
+    <dgm:pt modelId="{807EB391-0EB7-4AEC-8ADF-4DF63006CC0A}" type="sibTrans" cxnId="{034D111F-5C50-44E3-BBB3-68017A44BEA3}">
       <dgm:prSet/>
       <dgm:spPr/>
       <dgm:t>
@@ -2058,6 +2697,13 @@
         </dgm:presLayoutVars>
       </dgm:prSet>
       <dgm:spPr/>
+      <dgm:t>
+        <a:bodyPr/>
+        <a:lstStyle/>
+        <a:p>
+          <a:endParaRPr lang="de-DE"/>
+        </a:p>
+      </dgm:t>
     </dgm:pt>
     <dgm:pt modelId="{0E47A91A-DCFE-4805-8C09-EF57ED01F222}" type="pres">
       <dgm:prSet presAssocID="{4A495D54-D75E-49E1-BCEE-8DF88FD6BD43}" presName="centerShape" presStyleLbl="node0" presStyleIdx="0" presStyleCnt="1" custScaleX="95305" custScaleY="61764" custLinFactNeighborX="-17165" custLinFactNeighborY="-23709"/>
@@ -2077,6 +2723,13 @@
           <a:avLst/>
         </a:prstGeom>
       </dgm:spPr>
+      <dgm:t>
+        <a:bodyPr/>
+        <a:lstStyle/>
+        <a:p>
+          <a:endParaRPr lang="de-DE"/>
+        </a:p>
+      </dgm:t>
     </dgm:pt>
     <dgm:pt modelId="{2AB473A7-E881-48FB-A339-7CA526D211A8}" type="pres">
       <dgm:prSet presAssocID="{F643F399-19FC-44C4-9792-7801321EEE6B}" presName="node" presStyleLbl="node1" presStyleIdx="0" presStyleCnt="4" custScaleX="369619" custScaleY="61182" custRadScaleRad="124709" custRadScaleInc="127764">
@@ -2100,6 +2753,13 @@
           <a:avLst/>
         </a:prstGeom>
       </dgm:spPr>
+      <dgm:t>
+        <a:bodyPr/>
+        <a:lstStyle/>
+        <a:p>
+          <a:endParaRPr lang="de-DE"/>
+        </a:p>
+      </dgm:t>
     </dgm:pt>
     <dgm:pt modelId="{174B453C-AEDC-47CA-9456-2965350173AC}" type="pres">
       <dgm:prSet presAssocID="{0D323A20-7485-462F-B729-7FD9CC0D5D77}" presName="node" presStyleLbl="node1" presStyleIdx="1" presStyleCnt="4" custScaleX="85827" custScaleY="91138" custRadScaleRad="139330" custRadScaleInc="-100501">
@@ -2119,6 +2779,13 @@
     <dgm:pt modelId="{96F1FC95-0855-42F2-BBD0-28040252ED0D}" type="pres">
       <dgm:prSet presAssocID="{8ABD2D4D-8E3D-48D2-9CB7-E68FD70DAE38}" presName="parTrans" presStyleLbl="bgSibTrans2D1" presStyleIdx="2" presStyleCnt="4" custScaleX="40155" custLinFactNeighborX="-33061" custLinFactNeighborY="3349" custRadScaleRad="162386" custRadScaleInc="-2147483648"/>
       <dgm:spPr/>
+      <dgm:t>
+        <a:bodyPr/>
+        <a:lstStyle/>
+        <a:p>
+          <a:endParaRPr lang="de-DE"/>
+        </a:p>
+      </dgm:t>
     </dgm:pt>
     <dgm:pt modelId="{C05EC889-8A49-49A4-A317-D985BEA07008}" type="pres">
       <dgm:prSet presAssocID="{0C9832D4-13E1-49D2-ABAF-382FBB540A55}" presName="node" presStyleLbl="node1" presStyleIdx="2" presStyleCnt="4" custScaleX="91387" custRadScaleRad="72370" custRadScaleInc="50958">
@@ -2138,9 +2805,16 @@
     <dgm:pt modelId="{EC35D538-9C74-43E2-A70A-365A54020808}" type="pres">
       <dgm:prSet presAssocID="{B753AE40-C4B9-4F2D-8BD7-FD544D8B6BE3}" presName="parTrans" presStyleLbl="bgSibTrans2D1" presStyleIdx="3" presStyleCnt="4"/>
       <dgm:spPr/>
+      <dgm:t>
+        <a:bodyPr/>
+        <a:lstStyle/>
+        <a:p>
+          <a:endParaRPr lang="de-DE"/>
+        </a:p>
+      </dgm:t>
     </dgm:pt>
     <dgm:pt modelId="{BC6DD6BB-9C56-4B93-BDA2-95FD640A3819}" type="pres">
-      <dgm:prSet presAssocID="{2D47A800-E22E-450E-B551-2A4553FEAA31}" presName="node" presStyleLbl="node1" presStyleIdx="3" presStyleCnt="4" custRadScaleRad="33365" custRadScaleInc="-358123">
+      <dgm:prSet presAssocID="{2D47A800-E22E-450E-B551-2A4553FEAA31}" presName="node" presStyleLbl="node1" presStyleIdx="3" presStyleCnt="4" custScaleX="134193" custScaleY="130374" custRadScaleRad="33658" custRadScaleInc="-385538">
         <dgm:presLayoutVars>
           <dgm:bulletEnabled val="1"/>
         </dgm:presLayoutVars>
@@ -2157,56 +2831,73 @@
   </dgm:ptLst>
   <dgm:cxnLst>
     <dgm:cxn modelId="{2B90EFA7-71A0-4F9D-9AF7-85620BF6F01A}" type="presOf" srcId="{618CFD21-BE5C-4D26-A199-B12648592A41}" destId="{B17C1AB2-C3A3-4F6E-9953-3394C942F1F8}" srcOrd="0" destOrd="0" presId="urn:microsoft.com/office/officeart/2005/8/layout/radial4"/>
+    <dgm:cxn modelId="{BD6B26BE-D606-4045-8236-8B92A52B37AC}" srcId="{406ACA2A-AAFB-407F-92BC-4D75BC0F7C11}" destId="{80808EEF-9A01-4BEB-8649-EF4C72417A00}" srcOrd="2" destOrd="0" parTransId="{AFD8E1E5-1C14-4C2F-9A95-DAAC5B42D4EA}" sibTransId="{9133B303-3075-458F-9FAB-A66E4907D781}"/>
     <dgm:cxn modelId="{F5BC0A99-41D4-4FCF-B3FF-83D11DF3BFA5}" type="presOf" srcId="{F643F399-19FC-44C4-9792-7801321EEE6B}" destId="{2AB473A7-E881-48FB-A339-7CA526D211A8}" srcOrd="0" destOrd="0" presId="urn:microsoft.com/office/officeart/2005/8/layout/radial4"/>
+    <dgm:cxn modelId="{35D168BA-B36B-457E-BEB6-11C4E5006E74}" srcId="{7AAB1E8D-EDC5-4808-BB17-E168FF1D4DE5}" destId="{1719E1B8-65AB-4F26-8507-53CC9529C756}" srcOrd="1" destOrd="0" parTransId="{7EACC275-8818-46BF-AF85-2D3521B8CAC5}" sibTransId="{DD36B6F8-29D5-4925-94CE-AB244DEB8C70}"/>
     <dgm:cxn modelId="{7B1DB315-15D6-4C71-9282-190C5E666C58}" srcId="{4A495D54-D75E-49E1-BCEE-8DF88FD6BD43}" destId="{0C9832D4-13E1-49D2-ABAF-382FBB540A55}" srcOrd="2" destOrd="0" parTransId="{8ABD2D4D-8E3D-48D2-9CB7-E68FD70DAE38}" sibTransId="{67FFE516-9330-484F-A896-D0431C8D5880}"/>
+    <dgm:cxn modelId="{1B8B98A5-AC25-485A-AFE7-E97CEA2FE387}" srcId="{406ACA2A-AAFB-407F-92BC-4D75BC0F7C11}" destId="{DAFA9E92-0638-4E3D-A17C-08A411EC99DF}" srcOrd="1" destOrd="0" parTransId="{97D7AE8E-9F8F-462E-9938-F3826C22201F}" sibTransId="{54751568-42DD-4FEE-81E7-C21178DF748E}"/>
     <dgm:cxn modelId="{9CB99DCC-4219-47A1-8450-B1114E0B38D0}" srcId="{0C9832D4-13E1-49D2-ABAF-382FBB540A55}" destId="{F20A3EE0-23FA-40E8-B145-ED78E0956375}" srcOrd="1" destOrd="0" parTransId="{D74224D2-D002-4AED-ACC5-B21FDFEC8248}" sibTransId="{C8A120D4-92C6-493E-9797-8A804AEC4BF6}"/>
-    <dgm:cxn modelId="{649D418A-F9C9-4C17-915A-385E8AA79493}" srcId="{5EC9A276-C260-4ADF-B40E-BD9E4EE50F68}" destId="{E5250C47-A340-45EC-A891-E13ED7AA3154}" srcOrd="1" destOrd="0" parTransId="{6E841262-E556-411B-A0EB-D7F7250D0E2B}" sibTransId="{554CFAC1-A848-49DE-8AEF-3381BF8E7FAD}"/>
+    <dgm:cxn modelId="{649D418A-F9C9-4C17-915A-385E8AA79493}" srcId="{8B1DAD2D-0A6A-466D-AD46-C55684DCD61A}" destId="{E5250C47-A340-45EC-A891-E13ED7AA3154}" srcOrd="1" destOrd="0" parTransId="{6E841262-E556-411B-A0EB-D7F7250D0E2B}" sibTransId="{554CFAC1-A848-49DE-8AEF-3381BF8E7FAD}"/>
     <dgm:cxn modelId="{17DE9191-49E5-43ED-9DCE-C044630C57E8}" type="presOf" srcId="{F20A3EE0-23FA-40E8-B145-ED78E0956375}" destId="{C05EC889-8A49-49A4-A317-D985BEA07008}" srcOrd="0" destOrd="2" presId="urn:microsoft.com/office/officeart/2005/8/layout/radial4"/>
     <dgm:cxn modelId="{FECC3823-CD88-4019-9659-E4F0BCF1FD93}" srcId="{0D323A20-7485-462F-B729-7FD9CC0D5D77}" destId="{371F50EF-F16A-4B7E-84FF-074E6AAE39A2}" srcOrd="2" destOrd="0" parTransId="{9A5A479B-A29A-4EB1-B1D1-2A1A4E70FA22}" sibTransId="{E71B79B5-0F28-488B-B2BD-93B4ADFC859D}"/>
     <dgm:cxn modelId="{936CD798-87A3-4412-827D-FCCB0282BC1C}" type="presOf" srcId="{4A495D54-D75E-49E1-BCEE-8DF88FD6BD43}" destId="{0E47A91A-DCFE-4805-8C09-EF57ED01F222}" srcOrd="0" destOrd="0" presId="urn:microsoft.com/office/officeart/2005/8/layout/radial4"/>
     <dgm:cxn modelId="{BF5ADC8E-BD7C-49DE-BC88-F59DB41EC2D8}" type="presOf" srcId="{0C9832D4-13E1-49D2-ABAF-382FBB540A55}" destId="{C05EC889-8A49-49A4-A317-D985BEA07008}" srcOrd="0" destOrd="0" presId="urn:microsoft.com/office/officeart/2005/8/layout/radial4"/>
     <dgm:cxn modelId="{D7532B30-D908-4E9E-876F-685CFBE02562}" type="presOf" srcId="{7C78C476-6DE6-47C6-B5DD-71FD135D0409}" destId="{2AB473A7-E881-48FB-A339-7CA526D211A8}" srcOrd="0" destOrd="1" presId="urn:microsoft.com/office/officeart/2005/8/layout/radial4"/>
-    <dgm:cxn modelId="{B2818915-AC2E-45E2-9925-C34717E48DF4}" type="presOf" srcId="{DFA68AB6-92E4-4556-8B28-A164C2DCC351}" destId="{C05EC889-8A49-49A4-A317-D985BEA07008}" srcOrd="0" destOrd="5" presId="urn:microsoft.com/office/officeart/2005/8/layout/radial4"/>
-    <dgm:cxn modelId="{181505B2-42B6-46EF-B5F2-26F9789BC87F}" type="presOf" srcId="{5CDA70AD-A9E2-4342-BC2E-0F3082B6D93D}" destId="{BC6DD6BB-9C56-4B93-BDA2-95FD640A3819}" srcOrd="0" destOrd="6" presId="urn:microsoft.com/office/officeart/2005/8/layout/radial4"/>
+    <dgm:cxn modelId="{B2818915-AC2E-45E2-9925-C34717E48DF4}" type="presOf" srcId="{DFA68AB6-92E4-4556-8B28-A164C2DCC351}" destId="{C05EC889-8A49-49A4-A317-D985BEA07008}" srcOrd="0" destOrd="6" presId="urn:microsoft.com/office/officeart/2005/8/layout/radial4"/>
+    <dgm:cxn modelId="{181505B2-42B6-46EF-B5F2-26F9789BC87F}" type="presOf" srcId="{5CDA70AD-A9E2-4342-BC2E-0F3082B6D93D}" destId="{BC6DD6BB-9C56-4B93-BDA2-95FD640A3819}" srcOrd="0" destOrd="8" presId="urn:microsoft.com/office/officeart/2005/8/layout/radial4"/>
     <dgm:cxn modelId="{6F869AC5-A898-429F-8BBE-5B91248293A5}" type="presOf" srcId="{91A4DE8E-9752-44E0-87DB-76E247F7D743}" destId="{C05EC889-8A49-49A4-A317-D985BEA07008}" srcOrd="0" destOrd="1" presId="urn:microsoft.com/office/officeart/2005/8/layout/radial4"/>
+    <dgm:cxn modelId="{C4282562-3102-400E-9FE9-BF3BF397C1F7}" srcId="{0C9832D4-13E1-49D2-ABAF-382FBB540A55}" destId="{951A398F-1340-4BD7-A613-3706D21E2D7D}" srcOrd="3" destOrd="0" parTransId="{0641C504-F6C8-4EFD-8156-ECF389810430}" sibTransId="{F4B37CEE-62F3-4071-A72C-5197DA647390}"/>
     <dgm:cxn modelId="{5A8BEAD5-D6CE-40EF-8CC5-C944EF860BF8}" type="presOf" srcId="{F718BBD2-8E9E-4849-9168-F46CF11149E1}" destId="{174B453C-AEDC-47CA-9456-2965350173AC}" srcOrd="0" destOrd="2" presId="urn:microsoft.com/office/officeart/2005/8/layout/radial4"/>
-    <dgm:cxn modelId="{2B8A2F98-1DB7-4AB0-B97E-9537C2F7DAEE}" srcId="{0C9832D4-13E1-49D2-ABAF-382FBB540A55}" destId="{936AC397-9B78-4856-9213-85BB2A6C6C8A}" srcOrd="3" destOrd="0" parTransId="{877597A9-0AEC-467C-A077-6CA6CF1D2DF9}" sibTransId="{4DB518BD-FB82-4F27-8F4F-37A5875C3B2B}"/>
-    <dgm:cxn modelId="{89DF8A66-72E0-4ECE-8781-708D72C9E908}" type="presOf" srcId="{E5250C47-A340-45EC-A891-E13ED7AA3154}" destId="{BC6DD6BB-9C56-4B93-BDA2-95FD640A3819}" srcOrd="0" destOrd="3" presId="urn:microsoft.com/office/officeart/2005/8/layout/radial4"/>
+    <dgm:cxn modelId="{2B8A2F98-1DB7-4AB0-B97E-9537C2F7DAEE}" srcId="{0C9832D4-13E1-49D2-ABAF-382FBB540A55}" destId="{936AC397-9B78-4856-9213-85BB2A6C6C8A}" srcOrd="4" destOrd="0" parTransId="{877597A9-0AEC-467C-A077-6CA6CF1D2DF9}" sibTransId="{4DB518BD-FB82-4F27-8F4F-37A5875C3B2B}"/>
     <dgm:cxn modelId="{5110C41A-ADC3-40C8-AA91-11CC59E559EE}" type="presOf" srcId="{73152A58-6340-4164-82CD-F64131F4BF45}" destId="{174B453C-AEDC-47CA-9456-2965350173AC}" srcOrd="0" destOrd="4" presId="urn:microsoft.com/office/officeart/2005/8/layout/radial4"/>
+    <dgm:cxn modelId="{89DF8A66-72E0-4ECE-8781-708D72C9E908}" type="presOf" srcId="{E5250C47-A340-45EC-A891-E13ED7AA3154}" destId="{BC6DD6BB-9C56-4B93-BDA2-95FD640A3819}" srcOrd="0" destOrd="6" presId="urn:microsoft.com/office/officeart/2005/8/layout/radial4"/>
+    <dgm:cxn modelId="{26352D4B-B6FF-47E6-AE7D-6664DC7272A8}" srcId="{406ACA2A-AAFB-407F-92BC-4D75BC0F7C11}" destId="{A9692A02-8CAD-4842-B666-4692D91A1ED5}" srcOrd="0" destOrd="0" parTransId="{8FF7368B-3A47-4160-B1FB-4184454C1428}" sibTransId="{5E0FF279-1BA3-444A-9C6F-99320F8E27A5}"/>
+    <dgm:cxn modelId="{07D16696-501C-4D97-BAB6-031B2F01A87B}" type="presOf" srcId="{951A398F-1340-4BD7-A613-3706D21E2D7D}" destId="{C05EC889-8A49-49A4-A317-D985BEA07008}" srcOrd="0" destOrd="4" presId="urn:microsoft.com/office/officeart/2005/8/layout/radial4"/>
     <dgm:cxn modelId="{7103A681-2FE2-4EA2-9BB7-664FCAD95336}" type="presOf" srcId="{B753AE40-C4B9-4F2D-8BD7-FD544D8B6BE3}" destId="{EC35D538-9C74-43E2-A70A-365A54020808}" srcOrd="0" destOrd="0" presId="urn:microsoft.com/office/officeart/2005/8/layout/radial4"/>
     <dgm:cxn modelId="{3CA41F51-5862-49C1-A442-0424405A9DA0}" type="presOf" srcId="{6631FC67-1567-4C7E-BE68-DE6C3EEC3EF5}" destId="{287FF652-FE42-4D98-AF1A-F529DCD9492C}" srcOrd="0" destOrd="0" presId="urn:microsoft.com/office/officeart/2005/8/layout/radial4"/>
     <dgm:cxn modelId="{6C576ABD-CA2C-413C-AD47-59C0C0A222A4}" type="presOf" srcId="{40F8F8FD-11D4-49C8-A8AC-3F6C3C513E01}" destId="{C05EC889-8A49-49A4-A317-D985BEA07008}" srcOrd="0" destOrd="3" presId="urn:microsoft.com/office/officeart/2005/8/layout/radial4"/>
-    <dgm:cxn modelId="{A19FA1C9-09CD-465B-8752-B78659175316}" type="presOf" srcId="{5EC9A276-C260-4ADF-B40E-BD9E4EE50F68}" destId="{BC6DD6BB-9C56-4B93-BDA2-95FD640A3819}" srcOrd="0" destOrd="1" presId="urn:microsoft.com/office/officeart/2005/8/layout/radial4"/>
-    <dgm:cxn modelId="{F081001C-6919-4C44-BE81-90B871F4A9D3}" srcId="{0C9832D4-13E1-49D2-ABAF-382FBB540A55}" destId="{3D7B75EC-CB44-489D-A695-07CEF00A00DE}" srcOrd="5" destOrd="0" parTransId="{8D20290F-972F-4FF6-8D0E-7FFDFAB2909A}" sibTransId="{7177AC0A-D6FC-48B5-A509-5C78ED87BD59}"/>
+    <dgm:cxn modelId="{A19FA1C9-09CD-465B-8752-B78659175316}" type="presOf" srcId="{5EC9A276-C260-4ADF-B40E-BD9E4EE50F68}" destId="{BC6DD6BB-9C56-4B93-BDA2-95FD640A3819}" srcOrd="0" destOrd="3" presId="urn:microsoft.com/office/officeart/2005/8/layout/radial4"/>
+    <dgm:cxn modelId="{F081001C-6919-4C44-BE81-90B871F4A9D3}" srcId="{0C9832D4-13E1-49D2-ABAF-382FBB540A55}" destId="{3D7B75EC-CB44-489D-A695-07CEF00A00DE}" srcOrd="6" destOrd="0" parTransId="{8D20290F-972F-4FF6-8D0E-7FFDFAB2909A}" sibTransId="{7177AC0A-D6FC-48B5-A509-5C78ED87BD59}"/>
     <dgm:cxn modelId="{AAE76E6E-F0C4-4F95-B32B-2608CD07B3FF}" srcId="{4A495D54-D75E-49E1-BCEE-8DF88FD6BD43}" destId="{F643F399-19FC-44C4-9792-7801321EEE6B}" srcOrd="0" destOrd="0" parTransId="{6631FC67-1567-4C7E-BE68-DE6C3EEC3EF5}" sibTransId="{F7B78E84-F7A6-4DC0-A8E1-7342B4198CBB}"/>
     <dgm:cxn modelId="{988508CB-C8AC-47B0-B844-0D08505303C4}" srcId="{4A495D54-D75E-49E1-BCEE-8DF88FD6BD43}" destId="{0D323A20-7485-462F-B729-7FD9CC0D5D77}" srcOrd="1" destOrd="0" parTransId="{E73FC7B7-2743-4466-A08F-E5BA6AA510B7}" sibTransId="{434FCA06-FE9B-49DF-9B28-10368C0715D2}"/>
-    <dgm:cxn modelId="{6CD98A86-D30B-4ABD-91B5-7C1893BC46D5}" srcId="{5EC9A276-C260-4ADF-B40E-BD9E4EE50F68}" destId="{0F9B4200-4F89-4E0E-A12B-631AE80CB889}" srcOrd="0" destOrd="0" parTransId="{5F561712-DE44-4050-AC23-EFD63F97E89F}" sibTransId="{E265B731-B8B6-4F1B-B724-2B5451313EF6}"/>
-    <dgm:cxn modelId="{46488D94-949A-4293-ADE9-D7FF25666D8F}" type="presOf" srcId="{7AC40919-58AD-4963-942A-DFF9F06E2873}" destId="{BC6DD6BB-9C56-4B93-BDA2-95FD640A3819}" srcOrd="0" destOrd="5" presId="urn:microsoft.com/office/officeart/2005/8/layout/radial4"/>
+    <dgm:cxn modelId="{6CD98A86-D30B-4ABD-91B5-7C1893BC46D5}" srcId="{8B1DAD2D-0A6A-466D-AD46-C55684DCD61A}" destId="{0F9B4200-4F89-4E0E-A12B-631AE80CB889}" srcOrd="0" destOrd="0" parTransId="{5F561712-DE44-4050-AC23-EFD63F97E89F}" sibTransId="{E265B731-B8B6-4F1B-B724-2B5451313EF6}"/>
+    <dgm:cxn modelId="{6C7FB357-5EBB-4F2E-BF03-21A6404E4197}" type="presOf" srcId="{2E4B2F45-7376-412C-A61B-C71805181D05}" destId="{BC6DD6BB-9C56-4B93-BDA2-95FD640A3819}" srcOrd="0" destOrd="10" presId="urn:microsoft.com/office/officeart/2005/8/layout/radial4"/>
+    <dgm:cxn modelId="{46488D94-949A-4293-ADE9-D7FF25666D8F}" type="presOf" srcId="{7AC40919-58AD-4963-942A-DFF9F06E2873}" destId="{BC6DD6BB-9C56-4B93-BDA2-95FD640A3819}" srcOrd="0" destOrd="7" presId="urn:microsoft.com/office/officeart/2005/8/layout/radial4"/>
     <dgm:cxn modelId="{EAA66D08-6363-4F08-AF65-D551C18FE2DC}" type="presOf" srcId="{0D323A20-7485-462F-B729-7FD9CC0D5D77}" destId="{174B453C-AEDC-47CA-9456-2965350173AC}" srcOrd="0" destOrd="0" presId="urn:microsoft.com/office/officeart/2005/8/layout/radial4"/>
-    <dgm:cxn modelId="{F517E70D-7FB2-4575-9BED-F5530692D125}" type="presOf" srcId="{6F540D5A-20FD-4545-8149-B241A1ADD9FB}" destId="{BC6DD6BB-9C56-4B93-BDA2-95FD640A3819}" srcOrd="0" destOrd="4" presId="urn:microsoft.com/office/officeart/2005/8/layout/radial4"/>
     <dgm:cxn modelId="{C3F14241-6BE0-402F-B031-12F72C77D7C9}" srcId="{0C9832D4-13E1-49D2-ABAF-382FBB540A55}" destId="{91A4DE8E-9752-44E0-87DB-76E247F7D743}" srcOrd="0" destOrd="0" parTransId="{0DF71CB2-79A6-468C-A03F-89E33FDCEE7E}" sibTransId="{8FDAF07C-DE63-4014-AA79-0F585CE56CD0}"/>
-    <dgm:cxn modelId="{F6659FB1-D044-4506-88A0-DCB7037DF3E4}" srcId="{5EC9A276-C260-4ADF-B40E-BD9E4EE50F68}" destId="{6F540D5A-20FD-4545-8149-B241A1ADD9FB}" srcOrd="2" destOrd="0" parTransId="{7BD49258-9C3B-4532-B63A-237096A71993}" sibTransId="{BA6E5CA1-DA7C-4A59-91CD-160DED3C908D}"/>
+    <dgm:cxn modelId="{1647C037-3773-44BC-B5DF-CC092DB6DC7E}" srcId="{7AAB1E8D-EDC5-4808-BB17-E168FF1D4DE5}" destId="{406ACA2A-AAFB-407F-92BC-4D75BC0F7C11}" srcOrd="0" destOrd="0" parTransId="{A055DB7E-0003-4225-9093-E0B88240BBE0}" sibTransId="{B1F85018-77CF-4A14-B29C-E138F25DDA43}"/>
     <dgm:cxn modelId="{B825C61B-D974-4447-8448-ADF55A120C7B}" srcId="{7AC40919-58AD-4963-942A-DFF9F06E2873}" destId="{5CDA70AD-A9E2-4342-BC2E-0F3082B6D93D}" srcOrd="0" destOrd="0" parTransId="{5A20FCDF-B29C-4750-B767-6A6B5739DCDD}" sibTransId="{18AAC5BC-D7E2-4133-BFA5-7A153DE08866}"/>
     <dgm:cxn modelId="{C93FC4F0-5155-446A-A4FC-E0B808A613FC}" srcId="{0D323A20-7485-462F-B729-7FD9CC0D5D77}" destId="{F718BBD2-8E9E-4849-9168-F46CF11149E1}" srcOrd="1" destOrd="0" parTransId="{48A12357-E35B-40EA-80BE-D41676B6FF25}" sibTransId="{76D8159A-CCFF-48FD-8955-E7C996BE7CFF}"/>
-    <dgm:cxn modelId="{65E840DF-3B79-4496-8181-516B4DBE9E20}" type="presOf" srcId="{936AC397-9B78-4856-9213-85BB2A6C6C8A}" destId="{C05EC889-8A49-49A4-A317-D985BEA07008}" srcOrd="0" destOrd="4" presId="urn:microsoft.com/office/officeart/2005/8/layout/radial4"/>
+    <dgm:cxn modelId="{65E840DF-3B79-4496-8181-516B4DBE9E20}" type="presOf" srcId="{936AC397-9B78-4856-9213-85BB2A6C6C8A}" destId="{C05EC889-8A49-49A4-A317-D985BEA07008}" srcOrd="0" destOrd="5" presId="urn:microsoft.com/office/officeart/2005/8/layout/radial4"/>
     <dgm:cxn modelId="{90F6B2A7-C8C5-43B4-926D-A767C1490138}" type="presOf" srcId="{E73FC7B7-2743-4466-A08F-E5BA6AA510B7}" destId="{925CA080-D211-48AF-9D82-B93BD555A225}" srcOrd="0" destOrd="0" presId="urn:microsoft.com/office/officeart/2005/8/layout/radial4"/>
-    <dgm:cxn modelId="{A59514F4-B859-4F93-AE1F-29AF10EDB139}" srcId="{2D47A800-E22E-450E-B551-2A4553FEAA31}" destId="{7AC40919-58AD-4963-942A-DFF9F06E2873}" srcOrd="1" destOrd="0" parTransId="{E63569D2-60E2-4FC2-B657-755918422E0E}" sibTransId="{D1828F18-C844-4252-8EDC-D9DB3B79EAC1}"/>
-    <dgm:cxn modelId="{7DFF8174-E883-4312-9FB0-76AAED949670}" srcId="{0C9832D4-13E1-49D2-ABAF-382FBB540A55}" destId="{DFA68AB6-92E4-4556-8B28-A164C2DCC351}" srcOrd="4" destOrd="0" parTransId="{C2078A08-9828-4548-8B76-2DCC3CBF8DED}" sibTransId="{C7F36643-C0AC-4C3A-A57D-2F6283D0E290}"/>
+    <dgm:cxn modelId="{A59514F4-B859-4F93-AE1F-29AF10EDB139}" srcId="{5EC9A276-C260-4ADF-B40E-BD9E4EE50F68}" destId="{7AC40919-58AD-4963-942A-DFF9F06E2873}" srcOrd="1" destOrd="0" parTransId="{E63569D2-60E2-4FC2-B657-755918422E0E}" sibTransId="{D1828F18-C844-4252-8EDC-D9DB3B79EAC1}"/>
+    <dgm:cxn modelId="{B3C0272A-858D-4055-BC58-8E1AD6ED4D28}" type="presOf" srcId="{91B78057-8A07-42CE-B4A0-0F503D88C162}" destId="{BC6DD6BB-9C56-4B93-BDA2-95FD640A3819}" srcOrd="0" destOrd="2" presId="urn:microsoft.com/office/officeart/2005/8/layout/radial4"/>
+    <dgm:cxn modelId="{AF236F9A-521E-4695-8CA7-E07B694CFE4C}" srcId="{521DB9C5-6C86-4462-BE8B-20E4587C21FC}" destId="{2E4B2F45-7376-412C-A61B-C71805181D05}" srcOrd="0" destOrd="0" parTransId="{D03BE5F7-742E-408F-BD65-4914374EA44B}" sibTransId="{5DF6C0C8-1674-4C9D-918B-368DD4BD92D7}"/>
+    <dgm:cxn modelId="{900178D3-6C55-4114-A82A-1CA4C3AE7BCC}" srcId="{5EC9A276-C260-4ADF-B40E-BD9E4EE50F68}" destId="{8B1DAD2D-0A6A-466D-AD46-C55684DCD61A}" srcOrd="0" destOrd="0" parTransId="{A4FFB17F-04E6-4068-94B6-0AE36CD479A0}" sibTransId="{3F823D6E-C049-4873-9B6F-3E39E5E1308F}"/>
+    <dgm:cxn modelId="{7DFF8174-E883-4312-9FB0-76AAED949670}" srcId="{0C9832D4-13E1-49D2-ABAF-382FBB540A55}" destId="{DFA68AB6-92E4-4556-8B28-A164C2DCC351}" srcOrd="5" destOrd="0" parTransId="{C2078A08-9828-4548-8B76-2DCC3CBF8DED}" sibTransId="{C7F36643-C0AC-4C3A-A57D-2F6283D0E290}"/>
+    <dgm:cxn modelId="{3668B0CD-A909-4624-A2C8-E500874F6631}" type="presOf" srcId="{521DB9C5-6C86-4462-BE8B-20E4587C21FC}" destId="{BC6DD6BB-9C56-4B93-BDA2-95FD640A3819}" srcOrd="0" destOrd="9" presId="urn:microsoft.com/office/officeart/2005/8/layout/radial4"/>
     <dgm:cxn modelId="{D0CDF6CA-559B-4E30-AF91-2C4FE58AC735}" srcId="{0C9832D4-13E1-49D2-ABAF-382FBB540A55}" destId="{40F8F8FD-11D4-49C8-A8AC-3F6C3C513E01}" srcOrd="2" destOrd="0" parTransId="{A7F224B6-D7DE-49D4-934C-E7EDA7A27B3C}" sibTransId="{1108FF60-1291-405F-90BC-DC5A2C91EA7C}"/>
     <dgm:cxn modelId="{66722C0F-AAC5-42C2-8597-AD6E63028099}" srcId="{0D323A20-7485-462F-B729-7FD9CC0D5D77}" destId="{8673E5F2-C7D2-4688-B3A9-170DE336A521}" srcOrd="0" destOrd="0" parTransId="{23D0BF56-D398-4ACB-8E16-2D31F79ACC81}" sibTransId="{E9E84979-0853-491D-8D5D-B825D22A6981}"/>
     <dgm:cxn modelId="{A47413F2-A4FB-467E-ADF3-BDDE038BB5F2}" type="presOf" srcId="{8F401408-1245-4803-B9DC-4F1E9294A23D}" destId="{2AB473A7-E881-48FB-A339-7CA526D211A8}" srcOrd="0" destOrd="3" presId="urn:microsoft.com/office/officeart/2005/8/layout/radial4"/>
+    <dgm:cxn modelId="{06F6EE21-F110-4DEE-9D70-6040CA088186}" srcId="{0D323A20-7485-462F-B729-7FD9CC0D5D77}" destId="{73152A58-6340-4164-82CD-F64131F4BF45}" srcOrd="3" destOrd="0" parTransId="{159B2FCB-7BB0-4183-A21F-9A63E457F469}" sibTransId="{D6F2DA86-F9F8-4263-BDE8-853E25CE2A9B}"/>
     <dgm:cxn modelId="{076B2645-5EEB-4AF6-B9A4-6D18061219BE}" type="presOf" srcId="{8673E5F2-C7D2-4688-B3A9-170DE336A521}" destId="{174B453C-AEDC-47CA-9456-2965350173AC}" srcOrd="0" destOrd="1" presId="urn:microsoft.com/office/officeart/2005/8/layout/radial4"/>
-    <dgm:cxn modelId="{06F6EE21-F110-4DEE-9D70-6040CA088186}" srcId="{0D323A20-7485-462F-B729-7FD9CC0D5D77}" destId="{73152A58-6340-4164-82CD-F64131F4BF45}" srcOrd="3" destOrd="0" parTransId="{159B2FCB-7BB0-4183-A21F-9A63E457F469}" sibTransId="{D6F2DA86-F9F8-4263-BDE8-853E25CE2A9B}"/>
+    <dgm:cxn modelId="{B51D16F0-8158-4B36-A0CA-9D38D94FC1F1}" srcId="{618CFD21-BE5C-4D26-A199-B12648592A41}" destId="{7AAB1E8D-EDC5-4808-BB17-E168FF1D4DE5}" srcOrd="1" destOrd="0" parTransId="{7092AB1A-F1F7-4A1E-B11D-B4D1125D2D5B}" sibTransId="{807C31F2-2D0B-45B7-8960-2C2EFD23E70C}"/>
     <dgm:cxn modelId="{F810D02F-E153-473F-91B7-80A2E4061FFC}" type="presOf" srcId="{2D47A800-E22E-450E-B551-2A4553FEAA31}" destId="{BC6DD6BB-9C56-4B93-BDA2-95FD640A3819}" srcOrd="0" destOrd="0" presId="urn:microsoft.com/office/officeart/2005/8/layout/radial4"/>
     <dgm:cxn modelId="{AFAA9108-8263-49B4-BBD7-032B414D2B78}" type="presOf" srcId="{8ABD2D4D-8E3D-48D2-9CB7-E68FD70DAE38}" destId="{96F1FC95-0855-42F2-BBD0-28040252ED0D}" srcOrd="0" destOrd="0" presId="urn:microsoft.com/office/officeart/2005/8/layout/radial4"/>
+    <dgm:cxn modelId="{DFF1DDE5-B798-4F64-900F-E768569BDF5C}" type="presOf" srcId="{8B1DAD2D-0A6A-466D-AD46-C55684DCD61A}" destId="{BC6DD6BB-9C56-4B93-BDA2-95FD640A3819}" srcOrd="0" destOrd="4" presId="urn:microsoft.com/office/officeart/2005/8/layout/radial4"/>
+    <dgm:cxn modelId="{034D111F-5C50-44E3-BBB3-68017A44BEA3}" srcId="{73CEFFF8-35E5-4728-8E0E-6E29B919EC7B}" destId="{91B78057-8A07-42CE-B4A0-0F503D88C162}" srcOrd="0" destOrd="0" parTransId="{AA7D76F8-42E7-4D95-BAC7-076AAC6E240E}" sibTransId="{807EB391-0EB7-4AEC-8ADF-4DF63006CC0A}"/>
+    <dgm:cxn modelId="{ADC178D3-BF28-4393-886D-734DB67C4BFE}" type="presOf" srcId="{73CEFFF8-35E5-4728-8E0E-6E29B919EC7B}" destId="{BC6DD6BB-9C56-4B93-BDA2-95FD640A3819}" srcOrd="0" destOrd="1" presId="urn:microsoft.com/office/officeart/2005/8/layout/radial4"/>
     <dgm:cxn modelId="{79D6D5F9-D026-4FDA-B123-EF7746877BAF}" type="presOf" srcId="{371F50EF-F16A-4B7E-84FF-074E6AAE39A2}" destId="{174B453C-AEDC-47CA-9456-2965350173AC}" srcOrd="0" destOrd="3" presId="urn:microsoft.com/office/officeart/2005/8/layout/radial4"/>
     <dgm:cxn modelId="{104A55A5-18ED-453D-A8EF-B3D7015BCB65}" srcId="{F643F399-19FC-44C4-9792-7801321EEE6B}" destId="{8F401408-1245-4803-B9DC-4F1E9294A23D}" srcOrd="2" destOrd="0" parTransId="{A64CB696-0CBC-4F74-A9B4-DAD9A276F839}" sibTransId="{68E00D28-D60C-4618-BD26-9E441AE8B033}"/>
     <dgm:cxn modelId="{DA97A000-BBB1-42F7-B1B0-4A2E172F8109}" srcId="{618CFD21-BE5C-4D26-A199-B12648592A41}" destId="{4A495D54-D75E-49E1-BCEE-8DF88FD6BD43}" srcOrd="0" destOrd="0" parTransId="{A1643E5B-A8BC-4EA8-BC21-0657ABE8B4D4}" sibTransId="{A5811FB0-8DA6-45C1-8383-09BEC92137BB}"/>
-    <dgm:cxn modelId="{6C1FCB2B-E950-416A-851B-17B3F0240F4E}" type="presOf" srcId="{3D7B75EC-CB44-489D-A695-07CEF00A00DE}" destId="{C05EC889-8A49-49A4-A317-D985BEA07008}" srcOrd="0" destOrd="6" presId="urn:microsoft.com/office/officeart/2005/8/layout/radial4"/>
-    <dgm:cxn modelId="{0692FC60-B87C-4F47-9A45-2A8213F00A21}" srcId="{2D47A800-E22E-450E-B551-2A4553FEAA31}" destId="{5EC9A276-C260-4ADF-B40E-BD9E4EE50F68}" srcOrd="0" destOrd="0" parTransId="{D0ED3A3B-BD74-4C51-AB5E-5E5381E315E7}" sibTransId="{41644D9A-C100-45C7-BDBA-5BF2982CE40B}"/>
+    <dgm:cxn modelId="{B3A4ABA2-5CC8-4781-B1A3-EF0570E1CE62}" srcId="{1719E1B8-65AB-4F26-8507-53CC9529C756}" destId="{D3D7D615-2721-411C-8C7D-BDA6572C165C}" srcOrd="0" destOrd="0" parTransId="{6CB60B9A-769A-400A-9D55-12BB9271F8CD}" sibTransId="{90912AC2-6A4E-4C6B-A61F-9F9716017E42}"/>
+    <dgm:cxn modelId="{6C1FCB2B-E950-416A-851B-17B3F0240F4E}" type="presOf" srcId="{3D7B75EC-CB44-489D-A695-07CEF00A00DE}" destId="{C05EC889-8A49-49A4-A317-D985BEA07008}" srcOrd="0" destOrd="7" presId="urn:microsoft.com/office/officeart/2005/8/layout/radial4"/>
+    <dgm:cxn modelId="{D503C129-2CFD-46CF-8D82-609B8F92AAAE}" srcId="{2D47A800-E22E-450E-B551-2A4553FEAA31}" destId="{521DB9C5-6C86-4462-BE8B-20E4587C21FC}" srcOrd="2" destOrd="0" parTransId="{B06AE8D0-2D1B-4EF5-B884-E58E1C173DA7}" sibTransId="{BF7E3172-E7BE-4F12-B7D7-9E43A7B8651C}"/>
+    <dgm:cxn modelId="{0692FC60-B87C-4F47-9A45-2A8213F00A21}" srcId="{2D47A800-E22E-450E-B551-2A4553FEAA31}" destId="{5EC9A276-C260-4ADF-B40E-BD9E4EE50F68}" srcOrd="1" destOrd="0" parTransId="{D0ED3A3B-BD74-4C51-AB5E-5E5381E315E7}" sibTransId="{41644D9A-C100-45C7-BDBA-5BF2982CE40B}"/>
     <dgm:cxn modelId="{2EB20CDE-EEF9-4E97-A9A3-CA056FF2B13A}" type="presOf" srcId="{7CC029CE-3435-48BA-8921-8F4E1A3DF763}" destId="{2AB473A7-E881-48FB-A339-7CA526D211A8}" srcOrd="0" destOrd="2" presId="urn:microsoft.com/office/officeart/2005/8/layout/radial4"/>
     <dgm:cxn modelId="{50BC59D0-2005-4087-9297-C8C463EB12D4}" srcId="{4A495D54-D75E-49E1-BCEE-8DF88FD6BD43}" destId="{2D47A800-E22E-450E-B551-2A4553FEAA31}" srcOrd="3" destOrd="0" parTransId="{B753AE40-C4B9-4F2D-8BD7-FD544D8B6BE3}" sibTransId="{31442770-02B7-49C8-852F-32F7389DB5B0}"/>
-    <dgm:cxn modelId="{CF7F357B-8F01-4615-818D-7C1C6A3BD4B5}" type="presOf" srcId="{0F9B4200-4F89-4E0E-A12B-631AE80CB889}" destId="{BC6DD6BB-9C56-4B93-BDA2-95FD640A3819}" srcOrd="0" destOrd="2" presId="urn:microsoft.com/office/officeart/2005/8/layout/radial4"/>
+    <dgm:cxn modelId="{DF3C357A-B86F-466A-A939-A22F8625B45C}" srcId="{2D47A800-E22E-450E-B551-2A4553FEAA31}" destId="{73CEFFF8-35E5-4728-8E0E-6E29B919EC7B}" srcOrd="0" destOrd="0" parTransId="{C77A319B-8487-423E-A529-29718FAACCA9}" sibTransId="{3FDE03FB-D050-40DA-A41E-9C7EC7ECE437}"/>
+    <dgm:cxn modelId="{CF7F357B-8F01-4615-818D-7C1C6A3BD4B5}" type="presOf" srcId="{0F9B4200-4F89-4E0E-A12B-631AE80CB889}" destId="{BC6DD6BB-9C56-4B93-BDA2-95FD640A3819}" srcOrd="0" destOrd="5" presId="urn:microsoft.com/office/officeart/2005/8/layout/radial4"/>
     <dgm:cxn modelId="{AEA56CE1-8FAE-4721-9B10-81BBB8C87E80}" srcId="{F643F399-19FC-44C4-9792-7801321EEE6B}" destId="{7C78C476-6DE6-47C6-B5DD-71FD135D0409}" srcOrd="0" destOrd="0" parTransId="{A88FB184-5AE0-4502-9B18-A92D923679EA}" sibTransId="{D181EB8C-6C26-4097-9749-6F997E66977A}"/>
     <dgm:cxn modelId="{6F78251F-6C30-480C-A9C3-938A6534D09C}" srcId="{F643F399-19FC-44C4-9792-7801321EEE6B}" destId="{7CC029CE-3435-48BA-8921-8F4E1A3DF763}" srcOrd="1" destOrd="0" parTransId="{7472E5E8-2C37-4CE7-957B-55299B7F3A25}" sibTransId="{7CB4B8A0-26DB-4415-89D5-77F5C36DE968}"/>
     <dgm:cxn modelId="{0E2D093E-3037-4109-B807-6F8295BF05C7}" type="presParOf" srcId="{B17C1AB2-C3A3-4F6E-9953-3394C942F1F8}" destId="{0E47A91A-DCFE-4805-8C09-EF57ED01F222}" srcOrd="0" destOrd="0" presId="urn:microsoft.com/office/officeart/2005/8/layout/radial4"/>
@@ -2244,7 +2935,7 @@
       </dsp:nvSpPr>
       <dsp:spPr>
         <a:xfrm>
-          <a:off x="3264728" y="2087895"/>
+          <a:off x="3091052" y="2087895"/>
           <a:ext cx="2038228" cy="1320908"/>
         </a:xfrm>
         <a:prstGeom prst="ellipse">
@@ -2350,7 +3041,7 @@
         </a:p>
       </dsp:txBody>
       <dsp:txXfrm>
-        <a:off x="3264728" y="2087895"/>
+        <a:off x="3091052" y="2087895"/>
         <a:ext cx="2038228" cy="1320908"/>
       </dsp:txXfrm>
     </dsp:sp>
@@ -2360,9 +3051,9 @@
         <dsp:cNvSpPr/>
       </dsp:nvSpPr>
       <dsp:spPr>
-        <a:xfrm rot="16200000">
-          <a:off x="3792670" y="1269691"/>
-          <a:ext cx="988650" cy="609511"/>
+        <a:xfrm rot="16232641">
+          <a:off x="3633129" y="1269629"/>
+          <a:ext cx="988103" cy="609511"/>
         </a:xfrm>
         <a:prstGeom prst="leftRightArrow">
           <a:avLst/>
@@ -2444,7 +3135,7 @@
       </dsp:nvSpPr>
       <dsp:spPr>
         <a:xfrm>
-          <a:off x="411309" y="72011"/>
+          <a:off x="258375" y="72011"/>
           <a:ext cx="7509570" cy="994430"/>
         </a:xfrm>
         <a:prstGeom prst="roundRect">
@@ -2622,7 +3313,7 @@
         </a:p>
       </dsp:txBody>
       <dsp:txXfrm>
-        <a:off x="411309" y="72011"/>
+        <a:off x="258375" y="72011"/>
         <a:ext cx="7509570" cy="994430"/>
       </dsp:txXfrm>
     </dsp:sp>
@@ -2633,7 +3324,7 @@
       </dsp:nvSpPr>
       <dsp:spPr>
         <a:xfrm rot="10790059">
-          <a:off x="2279511" y="2435472"/>
+          <a:off x="2105836" y="2435472"/>
           <a:ext cx="907013" cy="609511"/>
         </a:xfrm>
         <a:prstGeom prst="leftRightArrow">
@@ -2715,7 +3406,7 @@
       </dsp:nvSpPr>
       <dsp:spPr>
         <a:xfrm>
-          <a:off x="462881" y="2016215"/>
+          <a:off x="289205" y="2016215"/>
           <a:ext cx="1743752" cy="1481324"/>
         </a:xfrm>
         <a:prstGeom prst="roundRect">
@@ -2792,12 +3483,12 @@
         </a:fontRef>
       </dsp:style>
       <dsp:txBody>
-        <a:bodyPr spcFirstLastPara="0" vert="horz" wrap="square" lIns="24765" tIns="24765" rIns="24765" bIns="24765" numCol="1" spcCol="1270" anchor="t" anchorCtr="0">
+        <a:bodyPr spcFirstLastPara="0" vert="horz" wrap="square" lIns="22860" tIns="22860" rIns="22860" bIns="22860" numCol="1" spcCol="1270" anchor="t" anchorCtr="0">
           <a:noAutofit/>
         </a:bodyPr>
         <a:lstStyle/>
         <a:p>
-          <a:pPr lvl="0" algn="l" defTabSz="577850">
+          <a:pPr lvl="0" algn="l" defTabSz="533400">
             <a:lnSpc>
               <a:spcPct val="90000"/>
             </a:lnSpc>
@@ -2809,25 +3500,25 @@
             </a:spcAft>
           </a:pPr>
           <a:r>
-            <a:rPr lang="de-DE" sz="1300" kern="1200" dirty="0" smtClean="0"/>
+            <a:rPr lang="de-DE" sz="1200" kern="1200" dirty="0" smtClean="0"/>
             <a:t>ANT </a:t>
           </a:r>
           <a:r>
-            <a:rPr lang="de-DE" sz="1300" kern="1200" dirty="0" err="1" smtClean="0"/>
+            <a:rPr lang="de-DE" sz="1200" kern="1200" dirty="0" err="1" smtClean="0"/>
             <a:t>Movie</a:t>
           </a:r>
           <a:r>
-            <a:rPr lang="de-DE" sz="1300" kern="1200" dirty="0" smtClean="0"/>
+            <a:rPr lang="de-DE" sz="1200" kern="1200" dirty="0" smtClean="0"/>
             <a:t> </a:t>
           </a:r>
           <a:r>
-            <a:rPr lang="de-DE" sz="1300" kern="1200" dirty="0" err="1" smtClean="0"/>
+            <a:rPr lang="de-DE" sz="1200" kern="1200" dirty="0" err="1" smtClean="0"/>
             <a:t>Catalog</a:t>
           </a:r>
-          <a:endParaRPr lang="de-DE" sz="1300" kern="1200" dirty="0"/>
-        </a:p>
-        <a:p>
-          <a:pPr marL="57150" lvl="1" indent="-57150" algn="l" defTabSz="444500">
+          <a:endParaRPr lang="de-DE" sz="1200" kern="1200" dirty="0"/>
+        </a:p>
+        <a:p>
+          <a:pPr marL="57150" lvl="1" indent="-57150" algn="l" defTabSz="400050">
             <a:lnSpc>
               <a:spcPct val="90000"/>
             </a:lnSpc>
@@ -2840,25 +3531,25 @@
             <a:buChar char="••"/>
           </a:pPr>
           <a:r>
-            <a:rPr lang="de-DE" sz="1000" kern="1200" dirty="0" err="1" smtClean="0"/>
+            <a:rPr lang="de-DE" sz="900" kern="1200" dirty="0" err="1" smtClean="0"/>
             <a:t>External</a:t>
           </a:r>
           <a:r>
-            <a:rPr lang="de-DE" sz="1000" kern="1200" dirty="0" smtClean="0"/>
+            <a:rPr lang="de-DE" sz="900" kern="1200" dirty="0" smtClean="0"/>
             <a:t> </a:t>
           </a:r>
           <a:r>
-            <a:rPr lang="de-DE" sz="1000" kern="1200" dirty="0" err="1" smtClean="0"/>
+            <a:rPr lang="de-DE" sz="900" kern="1200" dirty="0" err="1" smtClean="0"/>
             <a:t>Catalog</a:t>
           </a:r>
           <a:r>
-            <a:rPr lang="de-DE" sz="1000" kern="1200" dirty="0" smtClean="0"/>
+            <a:rPr lang="de-DE" sz="900" kern="1200" dirty="0" smtClean="0"/>
             <a:t> Manager</a:t>
           </a:r>
-          <a:endParaRPr lang="de-DE" sz="1000" kern="1200" dirty="0"/>
-        </a:p>
-        <a:p>
-          <a:pPr marL="57150" lvl="1" indent="-57150" algn="l" defTabSz="444500">
+          <a:endParaRPr lang="de-DE" sz="900" kern="1200" dirty="0"/>
+        </a:p>
+        <a:p>
+          <a:pPr marL="57150" lvl="1" indent="-57150" algn="l" defTabSz="400050">
             <a:lnSpc>
               <a:spcPct val="90000"/>
             </a:lnSpc>
@@ -2871,29 +3562,29 @@
             <a:buChar char="••"/>
           </a:pPr>
           <a:r>
-            <a:rPr lang="de-DE" sz="1000" kern="1200" dirty="0" err="1" smtClean="0"/>
+            <a:rPr lang="de-DE" sz="900" kern="1200" dirty="0" err="1" smtClean="0"/>
             <a:t>Uses</a:t>
           </a:r>
           <a:r>
-            <a:rPr lang="de-DE" sz="1000" kern="1200" dirty="0" smtClean="0"/>
+            <a:rPr lang="de-DE" sz="900" kern="1200" dirty="0" smtClean="0"/>
             <a:t> same XML DB </a:t>
           </a:r>
           <a:r>
-            <a:rPr lang="de-DE" sz="1000" kern="1200" dirty="0" err="1" smtClean="0"/>
+            <a:rPr lang="de-DE" sz="900" kern="1200" dirty="0" err="1" smtClean="0"/>
             <a:t>as</a:t>
           </a:r>
           <a:r>
-            <a:rPr lang="de-DE" sz="1000" kern="1200" dirty="0" smtClean="0"/>
+            <a:rPr lang="de-DE" sz="900" kern="1200" dirty="0" smtClean="0"/>
             <a:t> </a:t>
           </a:r>
           <a:r>
-            <a:rPr lang="de-DE" sz="1000" kern="1200" dirty="0" err="1" smtClean="0"/>
+            <a:rPr lang="de-DE" sz="900" kern="1200" dirty="0" err="1" smtClean="0"/>
             <a:t>MyFilms</a:t>
           </a:r>
-          <a:endParaRPr lang="de-DE" sz="1000" kern="1200" dirty="0"/>
-        </a:p>
-        <a:p>
-          <a:pPr marL="57150" lvl="1" indent="-57150" algn="l" defTabSz="444500">
+          <a:endParaRPr lang="de-DE" sz="900" kern="1200" dirty="0"/>
+        </a:p>
+        <a:p>
+          <a:pPr marL="57150" lvl="1" indent="-57150" algn="l" defTabSz="400050">
             <a:lnSpc>
               <a:spcPct val="90000"/>
             </a:lnSpc>
@@ -2906,37 +3597,37 @@
             <a:buChar char="••"/>
           </a:pPr>
           <a:r>
-            <a:rPr lang="de-DE" sz="1000" kern="1200" dirty="0" err="1" smtClean="0"/>
+            <a:rPr lang="de-DE" sz="900" kern="1200" dirty="0" err="1" smtClean="0"/>
             <a:t>Scriptbased</a:t>
           </a:r>
           <a:r>
-            <a:rPr lang="de-DE" sz="1000" kern="1200" dirty="0" smtClean="0"/>
+            <a:rPr lang="de-DE" sz="900" kern="1200" dirty="0" smtClean="0"/>
             <a:t> </a:t>
           </a:r>
           <a:r>
-            <a:rPr lang="de-DE" sz="1000" kern="1200" dirty="0" err="1" smtClean="0"/>
+            <a:rPr lang="de-DE" sz="900" kern="1200" dirty="0" err="1" smtClean="0"/>
             <a:t>Grabbing</a:t>
           </a:r>
           <a:r>
-            <a:rPr lang="de-DE" sz="1000" kern="1200" dirty="0" smtClean="0"/>
+            <a:rPr lang="de-DE" sz="900" kern="1200" dirty="0" smtClean="0"/>
             <a:t> </a:t>
           </a:r>
           <a:r>
-            <a:rPr lang="de-DE" sz="1000" kern="1200" dirty="0" err="1" smtClean="0"/>
+            <a:rPr lang="de-DE" sz="900" kern="1200" dirty="0" err="1" smtClean="0"/>
             <a:t>of</a:t>
           </a:r>
           <a:r>
-            <a:rPr lang="de-DE" sz="1000" kern="1200" dirty="0" smtClean="0"/>
+            <a:rPr lang="de-DE" sz="900" kern="1200" dirty="0" smtClean="0"/>
             <a:t> </a:t>
           </a:r>
           <a:r>
-            <a:rPr lang="de-DE" sz="1000" kern="1200" dirty="0" err="1" smtClean="0"/>
+            <a:rPr lang="de-DE" sz="900" kern="1200" dirty="0" err="1" smtClean="0"/>
             <a:t>Moviedata</a:t>
           </a:r>
-          <a:endParaRPr lang="de-DE" sz="1000" kern="1200" dirty="0"/>
-        </a:p>
-        <a:p>
-          <a:pPr marL="57150" lvl="1" indent="-57150" algn="l" defTabSz="444500">
+          <a:endParaRPr lang="de-DE" sz="900" kern="1200" dirty="0"/>
+        </a:p>
+        <a:p>
+          <a:pPr marL="57150" lvl="1" indent="-57150" algn="l" defTabSz="400050">
             <a:lnSpc>
               <a:spcPct val="90000"/>
             </a:lnSpc>
@@ -2949,22 +3640,22 @@
             <a:buChar char="••"/>
           </a:pPr>
           <a:r>
-            <a:rPr lang="de-DE" sz="1000" kern="1200" dirty="0" smtClean="0"/>
+            <a:rPr lang="de-DE" sz="900" kern="1200" dirty="0" smtClean="0"/>
             <a:t>Manual Management </a:t>
           </a:r>
           <a:r>
-            <a:rPr lang="de-DE" sz="1000" kern="1200" dirty="0" err="1" smtClean="0"/>
+            <a:rPr lang="de-DE" sz="900" kern="1200" dirty="0" err="1" smtClean="0"/>
             <a:t>of</a:t>
           </a:r>
           <a:r>
-            <a:rPr lang="de-DE" sz="1000" kern="1200" dirty="0" smtClean="0"/>
+            <a:rPr lang="de-DE" sz="900" kern="1200" dirty="0" smtClean="0"/>
             <a:t> DB</a:t>
           </a:r>
-          <a:endParaRPr lang="de-DE" sz="1000" kern="1200" dirty="0"/>
+          <a:endParaRPr lang="de-DE" sz="900" kern="1200" dirty="0"/>
         </a:p>
       </dsp:txBody>
       <dsp:txXfrm>
-        <a:off x="462881" y="2016215"/>
+        <a:off x="289205" y="2016215"/>
         <a:ext cx="1743752" cy="1481324"/>
       </dsp:txXfrm>
     </dsp:sp>
@@ -2975,7 +3666,7 @@
       </dsp:nvSpPr>
       <dsp:spPr>
         <a:xfrm rot="21558164">
-          <a:off x="5344885" y="2440922"/>
+          <a:off x="5171210" y="2440922"/>
           <a:ext cx="631520" cy="609511"/>
         </a:xfrm>
         <a:prstGeom prst="leftArrow">
@@ -3060,7 +3751,7 @@
       </dsp:nvSpPr>
       <dsp:spPr>
         <a:xfrm>
-          <a:off x="6038537" y="1903014"/>
+          <a:off x="5864861" y="1903014"/>
           <a:ext cx="1856714" cy="1625364"/>
         </a:xfrm>
         <a:prstGeom prst="roundRect">
@@ -3137,12 +3828,12 @@
         </a:fontRef>
       </dsp:style>
       <dsp:txBody>
-        <a:bodyPr spcFirstLastPara="0" vert="horz" wrap="square" lIns="24765" tIns="24765" rIns="24765" bIns="24765" numCol="1" spcCol="1270" anchor="t" anchorCtr="0">
+        <a:bodyPr spcFirstLastPara="0" vert="horz" wrap="square" lIns="22860" tIns="22860" rIns="22860" bIns="22860" numCol="1" spcCol="1270" anchor="t" anchorCtr="0">
           <a:noAutofit/>
         </a:bodyPr>
         <a:lstStyle/>
         <a:p>
-          <a:pPr lvl="0" algn="l" defTabSz="577850">
+          <a:pPr lvl="0" algn="l" defTabSz="533400">
             <a:lnSpc>
               <a:spcPct val="90000"/>
             </a:lnSpc>
@@ -3154,41 +3845,49 @@
             </a:spcAft>
           </a:pPr>
           <a:r>
-            <a:rPr lang="de-DE" sz="1300" kern="1200" dirty="0" err="1" smtClean="0"/>
+            <a:rPr lang="de-DE" sz="1200" kern="1200" dirty="0" err="1" smtClean="0"/>
             <a:t>External</a:t>
           </a:r>
           <a:r>
-            <a:rPr lang="de-DE" sz="1300" kern="1200" dirty="0" smtClean="0"/>
+            <a:rPr lang="de-DE" sz="1200" kern="1200" dirty="0" smtClean="0"/>
             <a:t> </a:t>
           </a:r>
           <a:r>
-            <a:rPr lang="de-DE" sz="1300" kern="1200" dirty="0" err="1" smtClean="0"/>
+            <a:rPr lang="de-DE" sz="1200" kern="1200" dirty="0" err="1" smtClean="0"/>
             <a:t>Catalog</a:t>
           </a:r>
           <a:r>
-            <a:rPr lang="de-DE" sz="1300" kern="1200" dirty="0" smtClean="0"/>
-            <a:t> Manager (</a:t>
-          </a:r>
-          <a:r>
-            <a:rPr lang="de-DE" sz="1300" kern="1200" dirty="0" err="1" smtClean="0"/>
+            <a:rPr lang="de-DE" sz="1200" kern="1200" dirty="0" smtClean="0"/>
+            <a:t> </a:t>
+          </a:r>
+          <a:r>
+            <a:rPr lang="de-DE" sz="1200" kern="1200" dirty="0" smtClean="0"/>
+            <a:t>Managers </a:t>
+          </a:r>
+          <a:r>
+            <a:rPr lang="de-DE" sz="1200" kern="1200" dirty="0" smtClean="0"/>
+            <a:t>(</a:t>
+          </a:r>
+          <a:r>
+            <a:rPr lang="de-DE" sz="1200" kern="1200" dirty="0" err="1" smtClean="0"/>
             <a:t>import</a:t>
           </a:r>
           <a:r>
-            <a:rPr lang="de-DE" sz="1300" kern="1200" dirty="0" smtClean="0"/>
+            <a:rPr lang="de-DE" sz="1200" kern="1200" dirty="0" smtClean="0"/>
             <a:t> </a:t>
           </a:r>
           <a:r>
-            <a:rPr lang="de-DE" sz="1300" kern="1200" dirty="0" err="1" smtClean="0"/>
+            <a:rPr lang="de-DE" sz="1200" kern="1200" dirty="0" err="1" smtClean="0"/>
             <a:t>only</a:t>
           </a:r>
           <a:r>
-            <a:rPr lang="de-DE" sz="1300" kern="1200" dirty="0" smtClean="0"/>
+            <a:rPr lang="de-DE" sz="1200" kern="1200" dirty="0" smtClean="0"/>
             <a:t>)</a:t>
           </a:r>
-          <a:endParaRPr lang="de-DE" sz="1300" kern="1200" dirty="0"/>
-        </a:p>
-        <a:p>
-          <a:pPr marL="57150" lvl="1" indent="-57150" algn="l" defTabSz="444500">
+          <a:endParaRPr lang="de-DE" sz="1200" kern="1200" dirty="0"/>
+        </a:p>
+        <a:p>
+          <a:pPr marL="57150" lvl="1" indent="-57150" algn="l" defTabSz="400050">
             <a:lnSpc>
               <a:spcPct val="90000"/>
             </a:lnSpc>
@@ -3201,17 +3900,17 @@
             <a:buChar char="••"/>
           </a:pPr>
           <a:r>
-            <a:rPr lang="de-DE" sz="1000" kern="1200" dirty="0" smtClean="0"/>
+            <a:rPr lang="de-DE" sz="900" kern="1200" dirty="0" smtClean="0"/>
             <a:t> DVD </a:t>
           </a:r>
           <a:r>
-            <a:rPr lang="de-DE" sz="1000" kern="1200" dirty="0" err="1" smtClean="0"/>
+            <a:rPr lang="de-DE" sz="900" kern="1200" dirty="0" err="1" smtClean="0"/>
             <a:t>Profiler</a:t>
           </a:r>
-          <a:endParaRPr lang="de-DE" sz="1000" kern="1200" dirty="0"/>
-        </a:p>
-        <a:p>
-          <a:pPr marL="57150" lvl="1" indent="-57150" algn="l" defTabSz="444500">
+          <a:endParaRPr lang="de-DE" sz="900" kern="1200" dirty="0"/>
+        </a:p>
+        <a:p>
+          <a:pPr marL="57150" lvl="1" indent="-57150" algn="l" defTabSz="400050">
             <a:lnSpc>
               <a:spcPct val="90000"/>
             </a:lnSpc>
@@ -3224,29 +3923,29 @@
             <a:buChar char="••"/>
           </a:pPr>
           <a:r>
-            <a:rPr lang="de-DE" sz="1000" kern="1200" dirty="0" smtClean="0"/>
+            <a:rPr lang="de-DE" sz="900" kern="1200" dirty="0" smtClean="0"/>
             <a:t> </a:t>
           </a:r>
           <a:r>
-            <a:rPr lang="de-DE" sz="1000" kern="1200" dirty="0" err="1" smtClean="0"/>
+            <a:rPr lang="de-DE" sz="900" kern="1200" dirty="0" err="1" smtClean="0"/>
             <a:t>eXtreme</a:t>
           </a:r>
           <a:r>
-            <a:rPr lang="de-DE" sz="1000" kern="1200" dirty="0" smtClean="0"/>
+            <a:rPr lang="de-DE" sz="900" kern="1200" dirty="0" smtClean="0"/>
             <a:t> </a:t>
           </a:r>
           <a:r>
-            <a:rPr lang="de-DE" sz="1000" kern="1200" dirty="0" err="1" smtClean="0"/>
+            <a:rPr lang="de-DE" sz="900" kern="1200" dirty="0" err="1" smtClean="0"/>
             <a:t>Movie</a:t>
           </a:r>
           <a:r>
-            <a:rPr lang="de-DE" sz="1000" kern="1200" dirty="0" smtClean="0"/>
+            <a:rPr lang="de-DE" sz="900" kern="1200" dirty="0" smtClean="0"/>
             <a:t> Manager</a:t>
           </a:r>
-          <a:endParaRPr lang="de-DE" sz="1000" kern="1200" dirty="0"/>
-        </a:p>
-        <a:p>
-          <a:pPr marL="57150" lvl="1" indent="-57150" algn="l" defTabSz="444500">
+          <a:endParaRPr lang="de-DE" sz="900" kern="1200" dirty="0"/>
+        </a:p>
+        <a:p>
+          <a:pPr marL="57150" lvl="1" indent="-57150" algn="l" defTabSz="400050">
             <a:lnSpc>
               <a:spcPct val="90000"/>
             </a:lnSpc>
@@ -3259,13 +3958,17 @@
             <a:buChar char="••"/>
           </a:pPr>
           <a:r>
-            <a:rPr lang="de-DE" sz="1000" kern="1200" dirty="0" smtClean="0"/>
-            <a:t> XBMC</a:t>
-          </a:r>
-          <a:endParaRPr lang="de-DE" sz="1000" kern="1200" dirty="0"/>
-        </a:p>
-        <a:p>
-          <a:pPr marL="57150" lvl="1" indent="-57150" algn="l" defTabSz="444500">
+            <a:rPr lang="de-DE" sz="900" kern="1200" dirty="0" smtClean="0"/>
+            <a:t> </a:t>
+          </a:r>
+          <a:r>
+            <a:rPr lang="de-DE" sz="900" kern="1200" dirty="0" smtClean="0"/>
+            <a:t>Personal Video Database</a:t>
+          </a:r>
+          <a:endParaRPr lang="de-DE" sz="900" kern="1200" dirty="0"/>
+        </a:p>
+        <a:p>
+          <a:pPr marL="57150" lvl="1" indent="-57150" algn="l" defTabSz="400050">
             <a:lnSpc>
               <a:spcPct val="90000"/>
             </a:lnSpc>
@@ -3278,17 +3981,13 @@
             <a:buChar char="••"/>
           </a:pPr>
           <a:r>
-            <a:rPr lang="de-DE" sz="1000" kern="1200" dirty="0" smtClean="0"/>
-            <a:t> </a:t>
-          </a:r>
-          <a:r>
-            <a:rPr lang="de-DE" sz="1000" kern="1200" dirty="0" err="1" smtClean="0"/>
-            <a:t>MyMovies</a:t>
-          </a:r>
-          <a:endParaRPr lang="de-DE" sz="1000" kern="1200" dirty="0"/>
-        </a:p>
-        <a:p>
-          <a:pPr marL="57150" lvl="1" indent="-57150" algn="l" defTabSz="444500">
+            <a:rPr lang="de-DE" sz="900" kern="1200" dirty="0" smtClean="0"/>
+            <a:t> XBMC</a:t>
+          </a:r>
+          <a:endParaRPr lang="de-DE" sz="900" kern="1200" dirty="0"/>
+        </a:p>
+        <a:p>
+          <a:pPr marL="57150" lvl="1" indent="-57150" algn="l" defTabSz="400050">
             <a:lnSpc>
               <a:spcPct val="90000"/>
             </a:lnSpc>
@@ -3301,17 +4000,17 @@
             <a:buChar char="••"/>
           </a:pPr>
           <a:r>
-            <a:rPr lang="de-DE" sz="1000" kern="1200" dirty="0" smtClean="0"/>
+            <a:rPr lang="de-DE" sz="900" kern="1200" dirty="0" smtClean="0"/>
             <a:t> </a:t>
           </a:r>
           <a:r>
-            <a:rPr lang="de-DE" sz="1000" kern="1200" dirty="0" err="1" smtClean="0"/>
-            <a:t>MovieCollector</a:t>
-          </a:r>
-          <a:endParaRPr lang="de-DE" sz="1000" kern="1200" dirty="0"/>
-        </a:p>
-        <a:p>
-          <a:pPr marL="57150" lvl="1" indent="-57150" algn="l" defTabSz="444500">
+            <a:rPr lang="de-DE" sz="900" kern="1200" dirty="0" err="1" smtClean="0"/>
+            <a:t>MyMovies</a:t>
+          </a:r>
+          <a:endParaRPr lang="de-DE" sz="900" kern="1200" dirty="0"/>
+        </a:p>
+        <a:p>
+          <a:pPr marL="57150" lvl="1" indent="-57150" algn="l" defTabSz="400050">
             <a:lnSpc>
               <a:spcPct val="90000"/>
             </a:lnSpc>
@@ -3324,34 +4023,57 @@
             <a:buChar char="••"/>
           </a:pPr>
           <a:r>
-            <a:rPr lang="de-DE" sz="1000" kern="1200" dirty="0" smtClean="0"/>
+            <a:rPr lang="de-DE" sz="900" kern="1200" dirty="0" smtClean="0"/>
             <a:t> </a:t>
           </a:r>
           <a:r>
-            <a:rPr lang="de-DE" sz="1000" kern="1200" dirty="0" err="1" smtClean="0"/>
+            <a:rPr lang="de-DE" sz="900" kern="1200" dirty="0" err="1" smtClean="0"/>
+            <a:t>MovieCollector</a:t>
+          </a:r>
+          <a:endParaRPr lang="de-DE" sz="900" kern="1200" dirty="0"/>
+        </a:p>
+        <a:p>
+          <a:pPr marL="57150" lvl="1" indent="-57150" algn="l" defTabSz="400050">
+            <a:lnSpc>
+              <a:spcPct val="90000"/>
+            </a:lnSpc>
+            <a:spcBef>
+              <a:spcPct val="0"/>
+            </a:spcBef>
+            <a:spcAft>
+              <a:spcPct val="15000"/>
+            </a:spcAft>
+            <a:buChar char="••"/>
+          </a:pPr>
+          <a:r>
+            <a:rPr lang="de-DE" sz="900" kern="1200" dirty="0" smtClean="0"/>
+            <a:t> </a:t>
+          </a:r>
+          <a:r>
+            <a:rPr lang="de-DE" sz="900" kern="1200" dirty="0" err="1" smtClean="0"/>
             <a:t>Eax</a:t>
           </a:r>
           <a:r>
-            <a:rPr lang="de-DE" sz="1000" kern="1200" dirty="0" smtClean="0"/>
+            <a:rPr lang="de-DE" sz="900" kern="1200" dirty="0" smtClean="0"/>
             <a:t> </a:t>
           </a:r>
           <a:r>
-            <a:rPr lang="de-DE" sz="1000" kern="1200" dirty="0" err="1" smtClean="0"/>
+            <a:rPr lang="de-DE" sz="900" kern="1200" dirty="0" err="1" smtClean="0"/>
             <a:t>Movie</a:t>
           </a:r>
           <a:r>
-            <a:rPr lang="de-DE" sz="1000" kern="1200" dirty="0" smtClean="0"/>
+            <a:rPr lang="de-DE" sz="900" kern="1200" dirty="0" smtClean="0"/>
             <a:t> </a:t>
           </a:r>
           <a:r>
-            <a:rPr lang="de-DE" sz="1000" kern="1200" dirty="0" err="1" smtClean="0"/>
+            <a:rPr lang="de-DE" sz="900" kern="1200" dirty="0" err="1" smtClean="0"/>
             <a:t>Catalog</a:t>
           </a:r>
-          <a:endParaRPr lang="de-DE" sz="1000" kern="1200" dirty="0"/>
+          <a:endParaRPr lang="de-DE" sz="900" kern="1200" dirty="0"/>
         </a:p>
       </dsp:txBody>
       <dsp:txXfrm>
-        <a:off x="6038537" y="1903014"/>
+        <a:off x="5864861" y="1903014"/>
         <a:ext cx="1856714" cy="1625364"/>
       </dsp:txXfrm>
     </dsp:sp>
@@ -3361,9 +4083,9 @@
         <dsp:cNvSpPr/>
       </dsp:nvSpPr>
       <dsp:spPr>
-        <a:xfrm rot="5320875">
-          <a:off x="3969193" y="3481831"/>
-          <a:ext cx="677098" cy="609511"/>
+        <a:xfrm rot="5331697">
+          <a:off x="3690791" y="3597690"/>
+          <a:ext cx="884617" cy="609511"/>
         </a:xfrm>
         <a:prstGeom prst="leftArrow">
           <a:avLst>
@@ -3447,8 +4169,8 @@
       </dsp:nvSpPr>
       <dsp:spPr>
         <a:xfrm>
-          <a:off x="3299681" y="3312365"/>
-          <a:ext cx="2031705" cy="1625364"/>
+          <a:off x="2778684" y="3285141"/>
+          <a:ext cx="2726406" cy="2119052"/>
         </a:xfrm>
         <a:prstGeom prst="roundRect">
           <a:avLst>
@@ -3524,12 +4246,12 @@
         </a:fontRef>
       </dsp:style>
       <dsp:txBody>
-        <a:bodyPr spcFirstLastPara="0" vert="horz" wrap="square" lIns="24765" tIns="24765" rIns="24765" bIns="24765" numCol="1" spcCol="1270" anchor="ctr" anchorCtr="1">
+        <a:bodyPr spcFirstLastPara="0" vert="horz" wrap="square" lIns="30480" tIns="30480" rIns="30480" bIns="30480" numCol="1" spcCol="1270" anchor="ctr" anchorCtr="1">
           <a:noAutofit/>
         </a:bodyPr>
         <a:lstStyle/>
         <a:p>
-          <a:pPr lvl="0" algn="l" defTabSz="577850">
+          <a:pPr lvl="0" algn="l" defTabSz="711200">
             <a:lnSpc>
               <a:spcPct val="90000"/>
             </a:lnSpc>
@@ -3541,21 +4263,21 @@
             </a:spcAft>
           </a:pPr>
           <a:r>
-            <a:rPr lang="de-DE" sz="1300" kern="1200" dirty="0" smtClean="0"/>
-            <a:t>AMC Manager (</a:t>
-          </a:r>
-          <a:r>
-            <a:rPr lang="de-DE" sz="1300" kern="1200" dirty="0" err="1" smtClean="0"/>
-            <a:t>integrated</a:t>
-          </a:r>
-          <a:r>
-            <a:rPr lang="de-DE" sz="1300" kern="1200" dirty="0" smtClean="0"/>
-            <a:t>)</a:t>
-          </a:r>
-          <a:endParaRPr lang="de-DE" sz="1300" kern="1200" dirty="0"/>
-        </a:p>
-        <a:p>
-          <a:pPr marL="57150" lvl="1" indent="-57150" algn="l" defTabSz="444500">
+            <a:rPr lang="de-DE" sz="1600" kern="1200" dirty="0" smtClean="0">
+              <a:solidFill>
+                <a:schemeClr val="bg1"/>
+              </a:solidFill>
+            </a:rPr>
+            <a:t>Integrated Components</a:t>
+          </a:r>
+          <a:endParaRPr lang="de-DE" sz="1200" kern="1200" dirty="0" smtClean="0">
+            <a:solidFill>
+              <a:schemeClr val="bg1"/>
+            </a:solidFill>
+          </a:endParaRPr>
+        </a:p>
+        <a:p>
+          <a:pPr marL="114300" lvl="1" indent="-114300" algn="l" defTabSz="533400">
             <a:lnSpc>
               <a:spcPct val="90000"/>
             </a:lnSpc>
@@ -3568,17 +4290,29 @@
             <a:buChar char="••"/>
           </a:pPr>
           <a:r>
-            <a:rPr lang="de-DE" sz="1000" kern="1200" dirty="0" err="1" smtClean="0"/>
-            <a:t>Updating</a:t>
-          </a:r>
-          <a:r>
-            <a:rPr lang="de-DE" sz="1000" kern="1200" dirty="0" smtClean="0"/>
-            <a:t> Data</a:t>
-          </a:r>
-          <a:endParaRPr lang="de-DE" sz="1000" kern="1200" dirty="0"/>
-        </a:p>
-        <a:p>
-          <a:pPr marL="114300" lvl="2" indent="-57150" algn="l" defTabSz="444500">
+            <a:rPr lang="de-DE" sz="1200" b="1" kern="1200" dirty="0" err="1" smtClean="0">
+              <a:solidFill>
+                <a:schemeClr val="bg1"/>
+              </a:solidFill>
+            </a:rPr>
+            <a:t>MyFilms</a:t>
+          </a:r>
+          <a:r>
+            <a:rPr lang="de-DE" sz="1200" b="1" kern="1200" dirty="0" smtClean="0">
+              <a:solidFill>
+                <a:schemeClr val="bg1"/>
+              </a:solidFill>
+            </a:rPr>
+            <a:t> Setup</a:t>
+          </a:r>
+          <a:endParaRPr lang="de-DE" sz="1200" b="1" kern="1200" dirty="0">
+            <a:solidFill>
+              <a:schemeClr val="bg1"/>
+            </a:solidFill>
+          </a:endParaRPr>
+        </a:p>
+        <a:p>
+          <a:pPr marL="114300" lvl="2" indent="-57150" algn="l" defTabSz="400050">
             <a:lnSpc>
               <a:spcPct val="90000"/>
             </a:lnSpc>
@@ -3591,21 +4325,29 @@
             <a:buChar char="••"/>
           </a:pPr>
           <a:r>
-            <a:rPr lang="de-DE" sz="1000" kern="1200" dirty="0" smtClean="0"/>
-            <a:t>Scanning / </a:t>
-          </a:r>
-          <a:r>
-            <a:rPr lang="de-DE" sz="1000" kern="1200" dirty="0" err="1" smtClean="0"/>
-            <a:t>Updating</a:t>
-          </a:r>
-          <a:r>
-            <a:rPr lang="de-DE" sz="1000" kern="1200" dirty="0" smtClean="0"/>
-            <a:t> Films</a:t>
-          </a:r>
-          <a:endParaRPr lang="de-DE" sz="1000" kern="1200" dirty="0"/>
-        </a:p>
-        <a:p>
-          <a:pPr marL="114300" lvl="2" indent="-57150" algn="l" defTabSz="444500">
+            <a:rPr lang="de-DE" sz="900" b="1" kern="1200" dirty="0" smtClean="0">
+              <a:solidFill>
+                <a:schemeClr val="bg1"/>
+              </a:solidFill>
+            </a:rPr>
+            <a:t> </a:t>
+          </a:r>
+          <a:r>
+            <a:rPr lang="de-DE" sz="900" b="0" kern="1200" dirty="0" err="1" smtClean="0">
+              <a:solidFill>
+                <a:schemeClr val="bg1"/>
+              </a:solidFill>
+            </a:rPr>
+            <a:t>Configuration</a:t>
+          </a:r>
+          <a:endParaRPr lang="de-DE" sz="900" b="0" kern="1200" dirty="0">
+            <a:solidFill>
+              <a:schemeClr val="bg1"/>
+            </a:solidFill>
+          </a:endParaRPr>
+        </a:p>
+        <a:p>
+          <a:pPr marL="114300" lvl="1" indent="-114300" algn="l" defTabSz="533400">
             <a:lnSpc>
               <a:spcPct val="90000"/>
             </a:lnSpc>
@@ -3618,17 +4360,29 @@
             <a:buChar char="••"/>
           </a:pPr>
           <a:r>
-            <a:rPr lang="de-DE" sz="1000" kern="1200" dirty="0" err="1" smtClean="0"/>
-            <a:t>Grabbing</a:t>
-          </a:r>
-          <a:r>
-            <a:rPr lang="de-DE" sz="1000" kern="1200" dirty="0" smtClean="0"/>
-            <a:t> Internet Data</a:t>
-          </a:r>
-          <a:endParaRPr lang="de-DE" sz="1000" kern="1200" dirty="0"/>
-        </a:p>
-        <a:p>
-          <a:pPr marL="114300" lvl="2" indent="-57150" algn="l" defTabSz="444500">
+            <a:rPr lang="de-DE" sz="1200" b="1" kern="1200" dirty="0" smtClean="0">
+              <a:solidFill>
+                <a:schemeClr val="bg1"/>
+              </a:solidFill>
+            </a:rPr>
+            <a:t>AMC </a:t>
+          </a:r>
+          <a:r>
+            <a:rPr lang="de-DE" sz="1200" b="1" kern="1200" dirty="0" err="1" smtClean="0">
+              <a:solidFill>
+                <a:schemeClr val="bg1"/>
+              </a:solidFill>
+            </a:rPr>
+            <a:t>Updater</a:t>
+          </a:r>
+          <a:endParaRPr lang="de-DE" sz="1200" b="1" kern="1200" dirty="0">
+            <a:solidFill>
+              <a:schemeClr val="bg1"/>
+            </a:solidFill>
+          </a:endParaRPr>
+        </a:p>
+        <a:p>
+          <a:pPr marL="114300" lvl="2" indent="-57150" algn="l" defTabSz="400050">
             <a:lnSpc>
               <a:spcPct val="90000"/>
             </a:lnSpc>
@@ -3641,21 +4395,37 @@
             <a:buChar char="••"/>
           </a:pPr>
           <a:r>
-            <a:rPr lang="de-DE" sz="1000" kern="1200" dirty="0" err="1" smtClean="0"/>
-            <a:t>Grabbing</a:t>
-          </a:r>
-          <a:r>
-            <a:rPr lang="de-DE" sz="1000" kern="1200" dirty="0" smtClean="0"/>
+            <a:rPr lang="de-DE" sz="900" kern="1200" dirty="0" err="1" smtClean="0">
+              <a:solidFill>
+                <a:schemeClr val="bg1"/>
+              </a:solidFill>
+            </a:rPr>
+            <a:t>Updating</a:t>
+          </a:r>
+          <a:r>
+            <a:rPr lang="de-DE" sz="900" kern="1200" dirty="0" smtClean="0">
+              <a:solidFill>
+                <a:schemeClr val="bg1"/>
+              </a:solidFill>
+            </a:rPr>
             <a:t> </a:t>
           </a:r>
           <a:r>
-            <a:rPr lang="de-DE" sz="1000" kern="1200" dirty="0" err="1" smtClean="0"/>
-            <a:t>Fanart</a:t>
-          </a:r>
-          <a:endParaRPr lang="de-DE" sz="1000" kern="1200" dirty="0"/>
-        </a:p>
-        <a:p>
-          <a:pPr marL="57150" lvl="1" indent="-57150" algn="l" defTabSz="444500">
+            <a:rPr lang="de-DE" sz="900" kern="1200" dirty="0" err="1" smtClean="0">
+              <a:solidFill>
+                <a:schemeClr val="bg1"/>
+              </a:solidFill>
+            </a:rPr>
+            <a:t>data</a:t>
+          </a:r>
+          <a:endParaRPr lang="de-DE" sz="900" kern="1200" dirty="0">
+            <a:solidFill>
+              <a:schemeClr val="bg1"/>
+            </a:solidFill>
+          </a:endParaRPr>
+        </a:p>
+        <a:p>
+          <a:pPr marL="171450" lvl="3" indent="-57150" algn="l" defTabSz="400050">
             <a:lnSpc>
               <a:spcPct val="90000"/>
             </a:lnSpc>
@@ -3668,33 +4438,45 @@
             <a:buChar char="••"/>
           </a:pPr>
           <a:r>
-            <a:rPr lang="de-DE" sz="1000" kern="1200" dirty="0" smtClean="0"/>
-            <a:t>Manage </a:t>
-          </a:r>
-          <a:r>
-            <a:rPr lang="de-DE" sz="1000" kern="1200" dirty="0" err="1" smtClean="0"/>
-            <a:t>internal</a:t>
-          </a:r>
-          <a:r>
-            <a:rPr lang="de-DE" sz="1000" kern="1200" dirty="0" smtClean="0"/>
-            <a:t> </a:t>
-          </a:r>
-          <a:r>
-            <a:rPr lang="de-DE" sz="1000" kern="1200" dirty="0" err="1" smtClean="0"/>
-            <a:t>Movie</a:t>
-          </a:r>
-          <a:r>
-            <a:rPr lang="de-DE" sz="1000" kern="1200" dirty="0" smtClean="0"/>
-            <a:t> </a:t>
-          </a:r>
-          <a:r>
-            <a:rPr lang="de-DE" sz="1000" kern="1200" dirty="0" err="1" smtClean="0"/>
-            <a:t>Catalog</a:t>
-          </a:r>
-          <a:endParaRPr lang="de-DE" sz="1000" kern="1200" dirty="0"/>
-        </a:p>
-        <a:p>
-          <a:pPr marL="114300" lvl="2" indent="-57150" algn="l" defTabSz="444500">
+            <a:rPr lang="de-DE" sz="900" kern="1200" dirty="0" smtClean="0">
+              <a:solidFill>
+                <a:schemeClr val="bg1"/>
+              </a:solidFill>
+            </a:rPr>
+            <a:t> Scanning </a:t>
+          </a:r>
+          <a:r>
+            <a:rPr lang="de-DE" sz="900" kern="1200" dirty="0" smtClean="0">
+              <a:solidFill>
+                <a:schemeClr val="bg1"/>
+              </a:solidFill>
+            </a:rPr>
+            <a:t>/ </a:t>
+          </a:r>
+          <a:r>
+            <a:rPr lang="de-DE" sz="900" kern="1200" dirty="0" err="1" smtClean="0">
+              <a:solidFill>
+                <a:schemeClr val="bg1"/>
+              </a:solidFill>
+            </a:rPr>
+            <a:t>Updating</a:t>
+          </a:r>
+          <a:r>
+            <a:rPr lang="de-DE" sz="900" kern="1200" dirty="0" smtClean="0">
+              <a:solidFill>
+                <a:schemeClr val="bg1"/>
+              </a:solidFill>
+            </a:rPr>
+            <a:t> Films</a:t>
+          </a:r>
+          <a:endParaRPr lang="de-DE" sz="900" kern="1200" dirty="0">
+            <a:solidFill>
+              <a:schemeClr val="bg1"/>
+            </a:solidFill>
+          </a:endParaRPr>
+        </a:p>
+        <a:p>
+          <a:pPr marL="171450" lvl="3" indent="-57150" algn="l" defTabSz="400050">
             <a:lnSpc>
               <a:spcPct val="90000"/>
             </a:lnSpc>
@@ -3707,15 +4489,291 @@
             <a:buChar char="••"/>
           </a:pPr>
           <a:r>
-            <a:rPr lang="de-DE" sz="1000" kern="1200" dirty="0" smtClean="0"/>
-            <a:t>Edit Database</a:t>
-          </a:r>
-          <a:endParaRPr lang="de-DE" sz="1000" kern="1200" dirty="0"/>
+            <a:rPr lang="de-DE" sz="900" kern="1200" dirty="0" smtClean="0">
+              <a:solidFill>
+                <a:schemeClr val="bg1"/>
+              </a:solidFill>
+            </a:rPr>
+            <a:t> </a:t>
+          </a:r>
+          <a:r>
+            <a:rPr lang="de-DE" sz="900" kern="1200" dirty="0" err="1" smtClean="0">
+              <a:solidFill>
+                <a:schemeClr val="bg1"/>
+              </a:solidFill>
+            </a:rPr>
+            <a:t>Grabbing</a:t>
+          </a:r>
+          <a:r>
+            <a:rPr lang="de-DE" sz="900" kern="1200" dirty="0" smtClean="0">
+              <a:solidFill>
+                <a:schemeClr val="bg1"/>
+              </a:solidFill>
+            </a:rPr>
+            <a:t> </a:t>
+          </a:r>
+          <a:r>
+            <a:rPr lang="de-DE" sz="900" kern="1200" dirty="0" smtClean="0">
+              <a:solidFill>
+                <a:schemeClr val="bg1"/>
+              </a:solidFill>
+            </a:rPr>
+            <a:t>Internet </a:t>
+          </a:r>
+          <a:r>
+            <a:rPr lang="de-DE" sz="900" kern="1200" dirty="0" smtClean="0">
+              <a:solidFill>
+                <a:schemeClr val="bg1"/>
+              </a:solidFill>
+            </a:rPr>
+            <a:t>Data </a:t>
+          </a:r>
+          <a:r>
+            <a:rPr lang="de-DE" sz="900" kern="1200" dirty="0" err="1" smtClean="0">
+              <a:solidFill>
+                <a:schemeClr val="bg1"/>
+              </a:solidFill>
+            </a:rPr>
+            <a:t>and</a:t>
+          </a:r>
+          <a:r>
+            <a:rPr lang="de-DE" sz="900" kern="1200" dirty="0" smtClean="0">
+              <a:solidFill>
+                <a:schemeClr val="bg1"/>
+              </a:solidFill>
+            </a:rPr>
+            <a:t> </a:t>
+          </a:r>
+          <a:r>
+            <a:rPr lang="de-DE" sz="900" kern="1200" dirty="0" err="1" smtClean="0">
+              <a:solidFill>
+                <a:schemeClr val="bg1"/>
+              </a:solidFill>
+            </a:rPr>
+            <a:t>Fanart</a:t>
+          </a:r>
+          <a:endParaRPr lang="de-DE" sz="900" kern="1200" dirty="0">
+            <a:solidFill>
+              <a:schemeClr val="bg1"/>
+            </a:solidFill>
+          </a:endParaRPr>
+        </a:p>
+        <a:p>
+          <a:pPr marL="114300" lvl="2" indent="-57150" algn="l" defTabSz="400050">
+            <a:lnSpc>
+              <a:spcPct val="90000"/>
+            </a:lnSpc>
+            <a:spcBef>
+              <a:spcPct val="0"/>
+            </a:spcBef>
+            <a:spcAft>
+              <a:spcPct val="15000"/>
+            </a:spcAft>
+            <a:buChar char="••"/>
+          </a:pPr>
+          <a:r>
+            <a:rPr lang="de-DE" sz="900" kern="1200" dirty="0" smtClean="0">
+              <a:solidFill>
+                <a:schemeClr val="bg1"/>
+              </a:solidFill>
+            </a:rPr>
+            <a:t> Manage </a:t>
+          </a:r>
+          <a:r>
+            <a:rPr lang="de-DE" sz="900" kern="1200" dirty="0" err="1" smtClean="0">
+              <a:solidFill>
+                <a:schemeClr val="bg1"/>
+              </a:solidFill>
+            </a:rPr>
+            <a:t>internal</a:t>
+          </a:r>
+          <a:r>
+            <a:rPr lang="de-DE" sz="900" kern="1200" dirty="0" smtClean="0">
+              <a:solidFill>
+                <a:schemeClr val="bg1"/>
+              </a:solidFill>
+            </a:rPr>
+            <a:t> </a:t>
+          </a:r>
+          <a:r>
+            <a:rPr lang="de-DE" sz="900" kern="1200" dirty="0" err="1" smtClean="0">
+              <a:solidFill>
+                <a:schemeClr val="bg1"/>
+              </a:solidFill>
+            </a:rPr>
+            <a:t>Movie</a:t>
+          </a:r>
+          <a:r>
+            <a:rPr lang="de-DE" sz="900" kern="1200" dirty="0" smtClean="0">
+              <a:solidFill>
+                <a:schemeClr val="bg1"/>
+              </a:solidFill>
+            </a:rPr>
+            <a:t> </a:t>
+          </a:r>
+          <a:r>
+            <a:rPr lang="de-DE" sz="900" kern="1200" dirty="0" err="1" smtClean="0">
+              <a:solidFill>
+                <a:schemeClr val="bg1"/>
+              </a:solidFill>
+            </a:rPr>
+            <a:t>Catalog</a:t>
+          </a:r>
+          <a:endParaRPr lang="de-DE" sz="900" kern="1200" dirty="0">
+            <a:solidFill>
+              <a:schemeClr val="bg1"/>
+            </a:solidFill>
+          </a:endParaRPr>
+        </a:p>
+        <a:p>
+          <a:pPr marL="171450" lvl="3" indent="-57150" algn="l" defTabSz="400050">
+            <a:lnSpc>
+              <a:spcPct val="90000"/>
+            </a:lnSpc>
+            <a:spcBef>
+              <a:spcPct val="0"/>
+            </a:spcBef>
+            <a:spcAft>
+              <a:spcPct val="15000"/>
+            </a:spcAft>
+            <a:buChar char="••"/>
+          </a:pPr>
+          <a:r>
+            <a:rPr lang="de-DE" sz="900" kern="1200" dirty="0" smtClean="0">
+              <a:solidFill>
+                <a:schemeClr val="bg1"/>
+              </a:solidFill>
+            </a:rPr>
+            <a:t> Edit Database</a:t>
+          </a:r>
+          <a:endParaRPr lang="de-DE" sz="900" kern="1200" dirty="0">
+            <a:solidFill>
+              <a:schemeClr val="bg1"/>
+            </a:solidFill>
+          </a:endParaRPr>
+        </a:p>
+        <a:p>
+          <a:pPr marL="114300" lvl="1" indent="-114300" algn="l" defTabSz="533400">
+            <a:lnSpc>
+              <a:spcPct val="90000"/>
+            </a:lnSpc>
+            <a:spcBef>
+              <a:spcPct val="0"/>
+            </a:spcBef>
+            <a:spcAft>
+              <a:spcPct val="15000"/>
+            </a:spcAft>
+            <a:buChar char="••"/>
+          </a:pPr>
+          <a:r>
+            <a:rPr lang="de-DE" sz="1200" b="1" kern="1200" dirty="0" err="1" smtClean="0">
+              <a:solidFill>
+                <a:schemeClr val="bg1"/>
+              </a:solidFill>
+            </a:rPr>
+            <a:t>Grabber</a:t>
+          </a:r>
+          <a:r>
+            <a:rPr lang="de-DE" sz="1200" b="1" kern="1200" dirty="0" smtClean="0">
+              <a:solidFill>
+                <a:schemeClr val="bg1"/>
+              </a:solidFill>
+            </a:rPr>
+            <a:t> Interface</a:t>
+          </a:r>
+          <a:endParaRPr lang="de-DE" sz="1200" b="1" kern="1200" dirty="0">
+            <a:solidFill>
+              <a:schemeClr val="bg1"/>
+            </a:solidFill>
+          </a:endParaRPr>
+        </a:p>
+        <a:p>
+          <a:pPr marL="114300" lvl="2" indent="-57150" algn="l" defTabSz="400050">
+            <a:lnSpc>
+              <a:spcPct val="90000"/>
+            </a:lnSpc>
+            <a:spcBef>
+              <a:spcPct val="0"/>
+            </a:spcBef>
+            <a:spcAft>
+              <a:spcPct val="15000"/>
+            </a:spcAft>
+            <a:buChar char="••"/>
+          </a:pPr>
+          <a:r>
+            <a:rPr lang="de-DE" sz="900" kern="1200" dirty="0" smtClean="0">
+              <a:solidFill>
+                <a:schemeClr val="bg1"/>
+              </a:solidFill>
+            </a:rPr>
+            <a:t> Create &amp; </a:t>
+          </a:r>
+          <a:r>
+            <a:rPr lang="de-DE" sz="900" kern="1200" dirty="0" err="1" smtClean="0">
+              <a:solidFill>
+                <a:schemeClr val="bg1"/>
+              </a:solidFill>
+            </a:rPr>
+            <a:t>edit</a:t>
+          </a:r>
+          <a:r>
+            <a:rPr lang="de-DE" sz="900" kern="1200" dirty="0" smtClean="0">
+              <a:solidFill>
+                <a:schemeClr val="bg1"/>
+              </a:solidFill>
+            </a:rPr>
+            <a:t> </a:t>
+          </a:r>
+          <a:r>
+            <a:rPr lang="de-DE" sz="900" kern="1200" dirty="0" err="1" smtClean="0">
+              <a:solidFill>
+                <a:schemeClr val="bg1"/>
+              </a:solidFill>
+            </a:rPr>
+            <a:t>internet</a:t>
+          </a:r>
+          <a:r>
+            <a:rPr lang="de-DE" sz="900" kern="1200" dirty="0" smtClean="0">
+              <a:solidFill>
+                <a:schemeClr val="bg1"/>
+              </a:solidFill>
+            </a:rPr>
+            <a:t> </a:t>
+          </a:r>
+          <a:r>
+            <a:rPr lang="de-DE" sz="900" kern="1200" dirty="0" err="1" smtClean="0">
+              <a:solidFill>
+                <a:schemeClr val="bg1"/>
+              </a:solidFill>
+            </a:rPr>
+            <a:t>grabber</a:t>
+          </a:r>
+          <a:r>
+            <a:rPr lang="de-DE" sz="900" kern="1200" dirty="0" smtClean="0">
+              <a:solidFill>
+                <a:schemeClr val="bg1"/>
+              </a:solidFill>
+            </a:rPr>
+            <a:t> </a:t>
+          </a:r>
+          <a:r>
+            <a:rPr lang="de-DE" sz="900" kern="1200" dirty="0" err="1" smtClean="0">
+              <a:solidFill>
+                <a:schemeClr val="bg1"/>
+              </a:solidFill>
+            </a:rPr>
+            <a:t>scripts</a:t>
+          </a:r>
+          <a:endParaRPr lang="de-DE" sz="900" kern="1200" dirty="0">
+            <a:solidFill>
+              <a:schemeClr val="bg1"/>
+            </a:solidFill>
+          </a:endParaRPr>
         </a:p>
       </dsp:txBody>
       <dsp:txXfrm>
-        <a:off x="3299681" y="3312365"/>
-        <a:ext cx="2031705" cy="1625364"/>
+        <a:off x="2778684" y="3285141"/>
+        <a:ext cx="2726406" cy="2119052"/>
       </dsp:txXfrm>
     </dsp:sp>
   </dsp:spTree>
@@ -5280,7 +6338,8 @@
           <a:p>
             <a:fld id="{C254A809-1A3D-4563-BD8D-D40582FDB626}" type="datetimeFigureOut">
               <a:rPr lang="de-DE" smtClean="0"/>
-              <a:t>07.01.2011</a:t>
+              <a:pPr/>
+              <a:t>24.03.2011</a:t>
             </a:fld>
             <a:endParaRPr lang="de-DE"/>
           </a:p>
@@ -5322,6 +6381,7 @@
           <a:p>
             <a:fld id="{5F59E03D-C900-4068-8FE9-57E8A0301967}" type="slidenum">
               <a:rPr lang="de-DE" smtClean="0"/>
+              <a:pPr/>
               <a:t>‹Nr.›</a:t>
             </a:fld>
             <a:endParaRPr lang="de-DE"/>
@@ -5445,7 +6505,8 @@
           <a:p>
             <a:fld id="{C254A809-1A3D-4563-BD8D-D40582FDB626}" type="datetimeFigureOut">
               <a:rPr lang="de-DE" smtClean="0"/>
-              <a:t>07.01.2011</a:t>
+              <a:pPr/>
+              <a:t>24.03.2011</a:t>
             </a:fld>
             <a:endParaRPr lang="de-DE"/>
           </a:p>
@@ -5487,6 +6548,7 @@
           <a:p>
             <a:fld id="{5F59E03D-C900-4068-8FE9-57E8A0301967}" type="slidenum">
               <a:rPr lang="de-DE" smtClean="0"/>
+              <a:pPr/>
               <a:t>‹Nr.›</a:t>
             </a:fld>
             <a:endParaRPr lang="de-DE"/>
@@ -5620,7 +6682,8 @@
           <a:p>
             <a:fld id="{C254A809-1A3D-4563-BD8D-D40582FDB626}" type="datetimeFigureOut">
               <a:rPr lang="de-DE" smtClean="0"/>
-              <a:t>07.01.2011</a:t>
+              <a:pPr/>
+              <a:t>24.03.2011</a:t>
             </a:fld>
             <a:endParaRPr lang="de-DE"/>
           </a:p>
@@ -5662,6 +6725,7 @@
           <a:p>
             <a:fld id="{5F59E03D-C900-4068-8FE9-57E8A0301967}" type="slidenum">
               <a:rPr lang="de-DE" smtClean="0"/>
+              <a:pPr/>
               <a:t>‹Nr.›</a:t>
             </a:fld>
             <a:endParaRPr lang="de-DE"/>
@@ -5785,7 +6849,8 @@
           <a:p>
             <a:fld id="{C254A809-1A3D-4563-BD8D-D40582FDB626}" type="datetimeFigureOut">
               <a:rPr lang="de-DE" smtClean="0"/>
-              <a:t>07.01.2011</a:t>
+              <a:pPr/>
+              <a:t>24.03.2011</a:t>
             </a:fld>
             <a:endParaRPr lang="de-DE"/>
           </a:p>
@@ -5827,6 +6892,7 @@
           <a:p>
             <a:fld id="{5F59E03D-C900-4068-8FE9-57E8A0301967}" type="slidenum">
               <a:rPr lang="de-DE" smtClean="0"/>
+              <a:pPr/>
               <a:t>‹Nr.›</a:t>
             </a:fld>
             <a:endParaRPr lang="de-DE"/>
@@ -6026,7 +7092,8 @@
           <a:p>
             <a:fld id="{C254A809-1A3D-4563-BD8D-D40582FDB626}" type="datetimeFigureOut">
               <a:rPr lang="de-DE" smtClean="0"/>
-              <a:t>07.01.2011</a:t>
+              <a:pPr/>
+              <a:t>24.03.2011</a:t>
             </a:fld>
             <a:endParaRPr lang="de-DE"/>
           </a:p>
@@ -6068,6 +7135,7 @@
           <a:p>
             <a:fld id="{5F59E03D-C900-4068-8FE9-57E8A0301967}" type="slidenum">
               <a:rPr lang="de-DE" smtClean="0"/>
+              <a:pPr/>
               <a:t>‹Nr.›</a:t>
             </a:fld>
             <a:endParaRPr lang="de-DE"/>
@@ -6309,7 +7377,8 @@
           <a:p>
             <a:fld id="{C254A809-1A3D-4563-BD8D-D40582FDB626}" type="datetimeFigureOut">
               <a:rPr lang="de-DE" smtClean="0"/>
-              <a:t>07.01.2011</a:t>
+              <a:pPr/>
+              <a:t>24.03.2011</a:t>
             </a:fld>
             <a:endParaRPr lang="de-DE"/>
           </a:p>
@@ -6351,6 +7420,7 @@
           <a:p>
             <a:fld id="{5F59E03D-C900-4068-8FE9-57E8A0301967}" type="slidenum">
               <a:rPr lang="de-DE" smtClean="0"/>
+              <a:pPr/>
               <a:t>‹Nr.›</a:t>
             </a:fld>
             <a:endParaRPr lang="de-DE"/>
@@ -6726,7 +7796,8 @@
           <a:p>
             <a:fld id="{C254A809-1A3D-4563-BD8D-D40582FDB626}" type="datetimeFigureOut">
               <a:rPr lang="de-DE" smtClean="0"/>
-              <a:t>07.01.2011</a:t>
+              <a:pPr/>
+              <a:t>24.03.2011</a:t>
             </a:fld>
             <a:endParaRPr lang="de-DE"/>
           </a:p>
@@ -6768,6 +7839,7 @@
           <a:p>
             <a:fld id="{5F59E03D-C900-4068-8FE9-57E8A0301967}" type="slidenum">
               <a:rPr lang="de-DE" smtClean="0"/>
+              <a:pPr/>
               <a:t>‹Nr.›</a:t>
             </a:fld>
             <a:endParaRPr lang="de-DE"/>
@@ -6839,7 +7911,8 @@
           <a:p>
             <a:fld id="{C254A809-1A3D-4563-BD8D-D40582FDB626}" type="datetimeFigureOut">
               <a:rPr lang="de-DE" smtClean="0"/>
-              <a:t>07.01.2011</a:t>
+              <a:pPr/>
+              <a:t>24.03.2011</a:t>
             </a:fld>
             <a:endParaRPr lang="de-DE"/>
           </a:p>
@@ -6881,6 +7954,7 @@
           <a:p>
             <a:fld id="{5F59E03D-C900-4068-8FE9-57E8A0301967}" type="slidenum">
               <a:rPr lang="de-DE" smtClean="0"/>
+              <a:pPr/>
               <a:t>‹Nr.›</a:t>
             </a:fld>
             <a:endParaRPr lang="de-DE"/>
@@ -6929,7 +8003,8 @@
           <a:p>
             <a:fld id="{C254A809-1A3D-4563-BD8D-D40582FDB626}" type="datetimeFigureOut">
               <a:rPr lang="de-DE" smtClean="0"/>
-              <a:t>07.01.2011</a:t>
+              <a:pPr/>
+              <a:t>24.03.2011</a:t>
             </a:fld>
             <a:endParaRPr lang="de-DE"/>
           </a:p>
@@ -6971,6 +8046,7 @@
           <a:p>
             <a:fld id="{5F59E03D-C900-4068-8FE9-57E8A0301967}" type="slidenum">
               <a:rPr lang="de-DE" smtClean="0"/>
+              <a:pPr/>
               <a:t>‹Nr.›</a:t>
             </a:fld>
             <a:endParaRPr lang="de-DE"/>
@@ -7201,7 +8277,8 @@
           <a:p>
             <a:fld id="{C254A809-1A3D-4563-BD8D-D40582FDB626}" type="datetimeFigureOut">
               <a:rPr lang="de-DE" smtClean="0"/>
-              <a:t>07.01.2011</a:t>
+              <a:pPr/>
+              <a:t>24.03.2011</a:t>
             </a:fld>
             <a:endParaRPr lang="de-DE"/>
           </a:p>
@@ -7243,6 +8320,7 @@
           <a:p>
             <a:fld id="{5F59E03D-C900-4068-8FE9-57E8A0301967}" type="slidenum">
               <a:rPr lang="de-DE" smtClean="0"/>
+              <a:pPr/>
               <a:t>‹Nr.›</a:t>
             </a:fld>
             <a:endParaRPr lang="de-DE"/>
@@ -7449,7 +8527,8 @@
           <a:p>
             <a:fld id="{C254A809-1A3D-4563-BD8D-D40582FDB626}" type="datetimeFigureOut">
               <a:rPr lang="de-DE" smtClean="0"/>
-              <a:t>07.01.2011</a:t>
+              <a:pPr/>
+              <a:t>24.03.2011</a:t>
             </a:fld>
             <a:endParaRPr lang="de-DE"/>
           </a:p>
@@ -7491,6 +8570,7 @@
           <a:p>
             <a:fld id="{5F59E03D-C900-4068-8FE9-57E8A0301967}" type="slidenum">
               <a:rPr lang="de-DE" smtClean="0"/>
+              <a:pPr/>
               <a:t>‹Nr.›</a:t>
             </a:fld>
             <a:endParaRPr lang="de-DE"/>
@@ -7657,7 +8737,8 @@
           <a:p>
             <a:fld id="{C254A809-1A3D-4563-BD8D-D40582FDB626}" type="datetimeFigureOut">
               <a:rPr lang="de-DE" smtClean="0"/>
-              <a:t>07.01.2011</a:t>
+              <a:pPr/>
+              <a:t>24.03.2011</a:t>
             </a:fld>
             <a:endParaRPr lang="de-DE"/>
           </a:p>
@@ -7735,6 +8816,7 @@
           <a:p>
             <a:fld id="{5F59E03D-C900-4068-8FE9-57E8A0301967}" type="slidenum">
               <a:rPr lang="de-DE" smtClean="0"/>
+              <a:pPr/>
               <a:t>‹Nr.›</a:t>
             </a:fld>
             <a:endParaRPr lang="de-DE"/>
@@ -8180,32 +9262,6 @@
           </a:p>
         </p:txBody>
       </p:sp>
-      <p:sp>
-        <p:nvSpPr>
-          <p:cNvPr id="3" name="Untertitel 2"/>
-          <p:cNvSpPr>
-            <a:spLocks noGrp="1"/>
-          </p:cNvSpPr>
-          <p:nvPr>
-            <p:ph type="subTitle" idx="1"/>
-          </p:nvPr>
-        </p:nvSpPr>
-        <p:spPr>
-          <a:xfrm>
-            <a:off x="1331640" y="6381328"/>
-            <a:ext cx="6400800" cy="476672"/>
-          </a:xfrm>
-        </p:spPr>
-        <p:txBody>
-          <a:bodyPr>
-            <a:normAutofit fontScale="92500" lnSpcReduction="20000"/>
-          </a:bodyPr>
-          <a:lstStyle/>
-          <a:p>
-            <a:endParaRPr lang="de-DE" dirty="0"/>
-          </a:p>
-        </p:txBody>
-      </p:sp>
       <p:graphicFrame>
         <p:nvGraphicFramePr>
           <p:cNvPr id="4" name="Diagramm 3"/>
@@ -8230,7 +9286,7 @@
         </p:nvSpPr>
         <p:spPr>
           <a:xfrm>
-            <a:off x="4362668" y="3706146"/>
+            <a:off x="4211960" y="3717032"/>
             <a:ext cx="936104" cy="432048"/>
           </a:xfrm>
           <a:prstGeom prst="can">

</xml_diff>